<commit_message>
Added placeholder section to poster
</commit_message>
<xml_diff>
--- a/Poster/NSDI Poster.pptx
+++ b/Poster/NSDI Poster.pptx
@@ -203,7 +203,7 @@
           <a:p>
             <a:fld id="{F1C0B079-A316-4C9B-B165-DF9EA8325D2C}" type="datetimeFigureOut">
               <a:rPr lang="en-US" smtClean="0"/>
-              <a:t>3/26/18</a:t>
+              <a:t>4/1/18</a:t>
             </a:fld>
             <a:endParaRPr lang="en-US"/>
           </a:p>
@@ -368,7 +368,7 @@
           <a:p>
             <a:fld id="{38F28AB8-57D1-494F-9851-055AD867E790}" type="datetimeFigureOut">
               <a:rPr lang="en-US" smtClean="0"/>
-              <a:t>3/26/18</a:t>
+              <a:t>4/1/18</a:t>
             </a:fld>
             <a:endParaRPr lang="en-US"/>
           </a:p>
@@ -1876,7 +1876,7 @@
             <a:fld id="{ECAA57DF-1C19-4726-AB84-014692BAD8F5}" type="datetimeFigureOut">
               <a:rPr lang="en-US" smtClean="0"/>
               <a:pPr/>
-              <a:t>3/26/18</a:t>
+              <a:t>4/1/18</a:t>
             </a:fld>
             <a:endParaRPr lang="en-US"/>
           </a:p>
@@ -3284,7 +3284,7 @@
             <a:fld id="{ECAA57DF-1C19-4726-AB84-014692BAD8F5}" type="datetimeFigureOut">
               <a:rPr lang="en-US" smtClean="0"/>
               <a:pPr/>
-              <a:t>3/26/18</a:t>
+              <a:t>4/1/18</a:t>
             </a:fld>
             <a:endParaRPr lang="en-US"/>
           </a:p>
@@ -4686,7 +4686,7 @@
             <a:fld id="{ECAA57DF-1C19-4726-AB84-014692BAD8F5}" type="datetimeFigureOut">
               <a:rPr lang="en-US" smtClean="0"/>
               <a:pPr/>
-              <a:t>3/26/18</a:t>
+              <a:t>4/1/18</a:t>
             </a:fld>
             <a:endParaRPr lang="en-US"/>
           </a:p>
@@ -4949,7 +4949,7 @@
           <a:p>
             <a:fld id="{ECAA57DF-1C19-4726-AB84-014692BAD8F5}" type="datetimeFigureOut">
               <a:rPr lang="en-US" smtClean="0"/>
-              <a:t>3/26/18</a:t>
+              <a:t>4/1/18</a:t>
             </a:fld>
             <a:endParaRPr lang="en-US"/>
           </a:p>
@@ -8736,7 +8736,7 @@
             <a:fld id="{ECAA57DF-1C19-4726-AB84-014692BAD8F5}" type="datetimeFigureOut">
               <a:rPr lang="en-US" smtClean="0"/>
               <a:pPr/>
-              <a:t>3/26/18</a:t>
+              <a:t>4/1/18</a:t>
             </a:fld>
             <a:endParaRPr lang="en-US"/>
           </a:p>
@@ -10072,7 +10072,7 @@
             <a:fld id="{ECAA57DF-1C19-4726-AB84-014692BAD8F5}" type="datetimeFigureOut">
               <a:rPr lang="en-US" smtClean="0"/>
               <a:pPr/>
-              <a:t>3/26/18</a:t>
+              <a:t>4/1/18</a:t>
             </a:fld>
             <a:endParaRPr lang="en-US"/>
           </a:p>
@@ -11542,7 +11542,7 @@
             <a:fld id="{ECAA57DF-1C19-4726-AB84-014692BAD8F5}" type="datetimeFigureOut">
               <a:rPr lang="en-US" smtClean="0"/>
               <a:pPr/>
-              <a:t>3/26/18</a:t>
+              <a:t>4/1/18</a:t>
             </a:fld>
             <a:endParaRPr lang="en-US"/>
           </a:p>
@@ -13156,7 +13156,7 @@
             <a:fld id="{ECAA57DF-1C19-4726-AB84-014692BAD8F5}" type="datetimeFigureOut">
               <a:rPr lang="en-US" smtClean="0"/>
               <a:pPr/>
-              <a:t>3/26/18</a:t>
+              <a:t>4/1/18</a:t>
             </a:fld>
             <a:endParaRPr lang="en-US"/>
           </a:p>
@@ -14503,7 +14503,7 @@
             <a:fld id="{ECAA57DF-1C19-4726-AB84-014692BAD8F5}" type="datetimeFigureOut">
               <a:rPr lang="en-US" smtClean="0"/>
               <a:pPr/>
-              <a:t>3/26/18</a:t>
+              <a:t>4/1/18</a:t>
             </a:fld>
             <a:endParaRPr lang="en-US"/>
           </a:p>
@@ -14610,7 +14610,7 @@
             <a:fld id="{ECAA57DF-1C19-4726-AB84-014692BAD8F5}" type="datetimeFigureOut">
               <a:rPr lang="en-US" smtClean="0"/>
               <a:pPr/>
-              <a:t>3/26/18</a:t>
+              <a:t>4/1/18</a:t>
             </a:fld>
             <a:endParaRPr lang="en-US"/>
           </a:p>
@@ -16087,7 +16087,7 @@
             <a:fld id="{ECAA57DF-1C19-4726-AB84-014692BAD8F5}" type="datetimeFigureOut">
               <a:rPr lang="en-US" smtClean="0"/>
               <a:pPr/>
-              <a:t>3/26/18</a:t>
+              <a:t>4/1/18</a:t>
             </a:fld>
             <a:endParaRPr lang="en-US"/>
           </a:p>
@@ -17451,7 +17451,7 @@
             <a:fld id="{ECAA57DF-1C19-4726-AB84-014692BAD8F5}" type="datetimeFigureOut">
               <a:rPr lang="en-US" smtClean="0"/>
               <a:pPr/>
-              <a:t>3/26/18</a:t>
+              <a:t>4/1/18</a:t>
             </a:fld>
             <a:endParaRPr lang="en-US"/>
           </a:p>
@@ -17703,7 +17703,7 @@
             <a:fld id="{ECAA57DF-1C19-4726-AB84-014692BAD8F5}" type="datetimeFigureOut">
               <a:rPr lang="en-US" smtClean="0"/>
               <a:pPr/>
-              <a:t>3/26/18</a:t>
+              <a:t>4/1/18</a:t>
             </a:fld>
             <a:endParaRPr lang="en-US"/>
           </a:p>
@@ -18288,10 +18288,9 @@
           <a:lstStyle/>
           <a:p>
             <a:r>
-              <a:rPr lang="en-US" dirty="0" err="1"/>
-              <a:t>INtroduction</a:t>
+              <a:rPr lang="en-US" dirty="0"/>
+              <a:t>Introduction</a:t>
             </a:r>
-            <a:endParaRPr lang="en-US" dirty="0"/>
           </a:p>
         </p:txBody>
       </p:sp>
@@ -18307,8 +18306,8 @@
         </p:nvSpPr>
         <p:spPr>
           <a:xfrm>
-            <a:off x="1283494" y="7320915"/>
-            <a:ext cx="6710132" cy="7531552"/>
+            <a:off x="1261309" y="12273074"/>
+            <a:ext cx="12107781" cy="2674369"/>
           </a:xfrm>
         </p:spPr>
         <p:txBody>
@@ -18319,37 +18318,19 @@
           <a:p>
             <a:r>
               <a:rPr lang="en-US" sz="2800" dirty="0"/>
-              <a:t>Configurations are often complex, consisting of thousands of lines of low-level directives and dozens of symbolic references</a:t>
+              <a:t>State of the art tools offer simple tab-completion and preset templates</a:t>
             </a:r>
           </a:p>
           <a:p>
             <a:r>
               <a:rPr lang="en-US" sz="2800" dirty="0"/>
-              <a:t>Configuration errors are common and the leading cause of network outages</a:t>
+              <a:t>We predict a code completion engine would offer better resilience to human errors</a:t>
             </a:r>
           </a:p>
           <a:p>
-            <a:r>
-              <a:rPr lang="en-US" sz="2800" dirty="0"/>
-              <a:t>We propose a simple, yet powerful model inspired by code completion techniques and NLP research.</a:t>
-            </a:r>
-          </a:p>
-          <a:p>
-            <a:pPr marL="0" indent="0">
-              <a:buNone/>
-            </a:pPr>
             <a:endParaRPr lang="en-US" sz="2800" dirty="0"/>
           </a:p>
           <a:p>
-            <a:pPr marL="0" indent="0">
-              <a:buNone/>
-            </a:pPr>
-            <a:endParaRPr lang="en-US" sz="2800" dirty="0"/>
-          </a:p>
-          <a:p>
-            <a:pPr marL="0" indent="0">
-              <a:buNone/>
-            </a:pPr>
             <a:endParaRPr lang="en-US" sz="2800" dirty="0"/>
           </a:p>
         </p:txBody>
@@ -18364,14 +18345,19 @@
             <p:ph type="body" sz="quarter" idx="17"/>
           </p:nvPr>
         </p:nvSpPr>
-        <p:spPr/>
+        <p:spPr>
+          <a:xfrm>
+            <a:off x="1435894" y="15464320"/>
+            <a:ext cx="12801600" cy="1219200"/>
+          </a:xfrm>
+        </p:spPr>
         <p:txBody>
           <a:bodyPr/>
           <a:lstStyle/>
           <a:p>
             <a:r>
               <a:rPr lang="en-US" dirty="0"/>
-              <a:t>background</a:t>
+              <a:t>Feasibility analysis</a:t>
             </a:r>
           </a:p>
         </p:txBody>
@@ -18392,7 +18378,12 @@
             <p:ph sz="quarter" idx="25"/>
           </p:nvPr>
         </p:nvSpPr>
-        <p:spPr/>
+        <p:spPr>
+          <a:xfrm>
+            <a:off x="1143000" y="17314801"/>
+            <a:ext cx="12801600" cy="4936178"/>
+          </a:xfrm>
+        </p:spPr>
         <p:txBody>
           <a:bodyPr>
             <a:normAutofit/>
@@ -18401,23 +18392,20 @@
           <a:p>
             <a:r>
               <a:rPr lang="en-US" sz="2800" dirty="0"/>
-              <a:t>Previous measurement students have found extensive use of templates in configurations from actual networks</a:t>
+              <a:t>Previous measurement studies have revealed extensive use of templates in network configurations</a:t>
             </a:r>
           </a:p>
           <a:p>
             <a:r>
               <a:rPr lang="en-US" sz="2800" dirty="0"/>
-              <a:t>We expect a network’s configurations to share a common set of tokens and statements</a:t>
+              <a:t>Our observations indicate that most of a device’s configuration could be constructed from existing configurations</a:t>
             </a:r>
           </a:p>
           <a:p>
             <a:r>
               <a:rPr lang="en-US" sz="2800" dirty="0"/>
-              <a:t>Our observations indicate that most of a device’s configuration could be constructed from existing configurations </a:t>
+              <a:t>Our prediction engine thus constructs a model from histories of configurations</a:t>
             </a:r>
-          </a:p>
-          <a:p>
-            <a:endParaRPr lang="en-US" sz="2800" dirty="0"/>
           </a:p>
           <a:p>
             <a:pPr marL="0" indent="0">
@@ -18447,7 +18435,7 @@
             </p:nvSpPr>
             <p:spPr>
               <a:xfrm>
-                <a:off x="15544800" y="7759946"/>
+                <a:off x="15890528" y="15896176"/>
                 <a:ext cx="12801600" cy="4104191"/>
               </a:xfrm>
             </p:spPr>
@@ -18458,86 +18446,64 @@
               <a:lstStyle/>
               <a:p>
                 <a:r>
-                  <a:rPr lang="en-US" sz="2800" dirty="0">
-                    <a:latin typeface="Cambria Math" panose="02040503050406030204" pitchFamily="18" charset="0"/>
-                  </a:rPr>
+                  <a:rPr lang="en-US" sz="2800" dirty="0"/>
                   <a:t>N-grams are simple techniques that allow us to model how likely one token is to follow another one</a:t>
                 </a:r>
               </a:p>
               <a:p>
                 <a:r>
-                  <a:rPr lang="en-US" sz="2800" dirty="0">
-                    <a:latin typeface="Cambria Math" panose="02040503050406030204" pitchFamily="18" charset="0"/>
-                  </a:rPr>
+                  <a:rPr lang="en-US" sz="2800" dirty="0"/>
                   <a:t>Using previous </a:t>
                 </a:r>
                 <a14:m>
                   <m:oMath xmlns:m="http://schemas.openxmlformats.org/officeDocument/2006/math">
                     <m:r>
-                      <a:rPr lang="en-US" sz="2800" b="0" i="1" smtClean="0">
-                        <a:latin typeface="Cambria Math" panose="02040503050406030204" pitchFamily="18" charset="0"/>
-                      </a:rPr>
+                      <a:rPr lang="en-US" sz="2800" b="0" i="1" smtClean="0"/>
                       <m:t>𝑛</m:t>
                     </m:r>
                     <m:r>
-                      <a:rPr lang="en-US" sz="2800" b="0" i="1" smtClean="0">
-                        <a:latin typeface="Cambria Math" panose="02040503050406030204" pitchFamily="18" charset="0"/>
-                      </a:rPr>
+                      <a:rPr lang="en-US" sz="2800" b="0" i="1" smtClean="0"/>
                       <m:t>−1</m:t>
                     </m:r>
                   </m:oMath>
                 </a14:m>
                 <a:r>
-                  <a:rPr lang="en-US" sz="2800" dirty="0">
-                    <a:latin typeface="Cambria Math" panose="02040503050406030204" pitchFamily="18" charset="0"/>
-                  </a:rPr>
+                  <a:rPr lang="en-US" sz="2800" dirty="0"/>
                   <a:t> tokens, we predict the probability of the next one</a:t>
                 </a:r>
-                <a:endParaRPr lang="en-US" sz="2800" i="1" dirty="0">
-                  <a:latin typeface="Cambria Math" panose="02040503050406030204" pitchFamily="18" charset="0"/>
-                </a:endParaRPr>
+                <a:endParaRPr lang="en-US" sz="2800" i="1" dirty="0"/>
               </a:p>
               <a:p>
                 <a:pPr lvl="1"/>
                 <a14:m>
                   <m:oMath xmlns:m="http://schemas.openxmlformats.org/officeDocument/2006/math">
                     <m:r>
-                      <a:rPr lang="en-US" sz="1840" b="0" i="1" smtClean="0">
-                        <a:latin typeface="Cambria Math" panose="02040503050406030204" pitchFamily="18" charset="0"/>
-                      </a:rPr>
+                      <a:rPr lang="en-US" sz="2800" b="0" i="1" smtClean="0"/>
                       <m:t>𝑃</m:t>
                     </m:r>
                     <m:d>
                       <m:dPr>
                         <m:endChr m:val="|"/>
                         <m:ctrlPr>
-                          <a:rPr lang="en-US" sz="1840" b="0" i="1" smtClean="0">
-                            <a:latin typeface="Cambria Math" panose="02040503050406030204" pitchFamily="18" charset="0"/>
-                          </a:rPr>
+                          <a:rPr lang="en-US" sz="2800" b="0" i="1" smtClean="0"/>
                         </m:ctrlPr>
                       </m:dPr>
                       <m:e>
                         <m:sSub>
                           <m:sSubPr>
                             <m:ctrlPr>
-                              <a:rPr lang="en-US" sz="1840" b="0" i="1" smtClean="0">
-                                <a:latin typeface="Cambria Math" panose="02040503050406030204" pitchFamily="18" charset="0"/>
-                              </a:rPr>
+                              <a:rPr lang="en-US" sz="2800" b="0" i="1" smtClean="0"/>
                             </m:ctrlPr>
                           </m:sSubPr>
                           <m:e>
                             <m:r>
-                              <a:rPr lang="en-US" sz="1840" b="0" i="1" smtClean="0">
-                                <a:latin typeface="Cambria Math" panose="02040503050406030204" pitchFamily="18" charset="0"/>
-                              </a:rPr>
+                              <a:rPr lang="en-US" sz="2800" b="0" i="1" smtClean="0"/>
                               <m:t>𝑤</m:t>
                             </m:r>
                           </m:e>
                           <m:sub>
                             <m:r>
-                              <a:rPr lang="en-US" sz="1840" b="0" i="1" smtClean="0">
-                                <a:latin typeface="Cambria Math" panose="02040503050406030204" pitchFamily="18" charset="0"/>
-                              </a:rPr>
+                              <a:rPr lang="en-US" sz="2800" b="0" i="1" smtClean="0"/>
                               <m:t>𝑛</m:t>
                             </m:r>
                           </m:sub>
@@ -18545,163 +18511,121 @@
                       </m:e>
                     </m:d>
                     <m:r>
-                      <a:rPr lang="en-US" sz="1840" b="0" i="1" smtClean="0">
-                        <a:latin typeface="Cambria Math" panose="02040503050406030204" pitchFamily="18" charset="0"/>
-                      </a:rPr>
+                      <a:rPr lang="en-US" sz="2800" b="0" i="1" smtClean="0"/>
                       <m:t> </m:t>
                     </m:r>
                     <m:sSub>
                       <m:sSubPr>
                         <m:ctrlPr>
-                          <a:rPr lang="en-US" sz="1840" b="0" i="1" smtClean="0">
-                            <a:latin typeface="Cambria Math" panose="02040503050406030204" pitchFamily="18" charset="0"/>
-                          </a:rPr>
+                          <a:rPr lang="en-US" sz="2800" b="0" i="1" smtClean="0"/>
                         </m:ctrlPr>
                       </m:sSubPr>
                       <m:e>
                         <m:r>
-                          <a:rPr lang="en-US" sz="1840" b="0" i="1" smtClean="0">
-                            <a:latin typeface="Cambria Math" panose="02040503050406030204" pitchFamily="18" charset="0"/>
-                          </a:rPr>
+                          <a:rPr lang="en-US" sz="2800" b="0" i="1" smtClean="0"/>
                           <m:t>𝑤</m:t>
                         </m:r>
                       </m:e>
                       <m:sub>
                         <m:r>
-                          <a:rPr lang="en-US" sz="1840" b="0" i="1" smtClean="0">
-                            <a:latin typeface="Cambria Math" panose="02040503050406030204" pitchFamily="18" charset="0"/>
-                          </a:rPr>
+                          <a:rPr lang="en-US" sz="2800" b="0" i="1" smtClean="0"/>
                           <m:t>𝑛</m:t>
                         </m:r>
                         <m:r>
-                          <a:rPr lang="en-US" sz="1840" b="0" i="1" smtClean="0">
-                            <a:latin typeface="Cambria Math" panose="02040503050406030204" pitchFamily="18" charset="0"/>
-                          </a:rPr>
+                          <a:rPr lang="en-US" sz="2800" b="0" i="1" smtClean="0"/>
                           <m:t>−1</m:t>
                         </m:r>
                       </m:sub>
                     </m:sSub>
                     <m:r>
-                      <a:rPr lang="en-US" sz="1840" b="0" i="1" smtClean="0">
-                        <a:latin typeface="Cambria Math" panose="02040503050406030204" pitchFamily="18" charset="0"/>
-                      </a:rPr>
+                      <a:rPr lang="en-US" sz="2800" b="0" i="1" smtClean="0"/>
                       <m:t>,</m:t>
                     </m:r>
                     <m:sSub>
                       <m:sSubPr>
                         <m:ctrlPr>
-                          <a:rPr lang="en-US" sz="1840" i="1" smtClean="0">
-                            <a:latin typeface="Cambria Math" panose="02040503050406030204" pitchFamily="18" charset="0"/>
-                          </a:rPr>
+                          <a:rPr lang="en-US" sz="2800" i="1" smtClean="0"/>
                         </m:ctrlPr>
                       </m:sSubPr>
                       <m:e>
                         <m:r>
-                          <a:rPr lang="en-US" sz="1840" i="1">
-                            <a:latin typeface="Cambria Math" panose="02040503050406030204" pitchFamily="18" charset="0"/>
-                          </a:rPr>
+                          <a:rPr lang="en-US" sz="2800" i="1"/>
                           <m:t>𝑤</m:t>
                         </m:r>
                       </m:e>
                       <m:sub>
                         <m:r>
-                          <a:rPr lang="en-US" sz="1840" i="1">
-                            <a:latin typeface="Cambria Math" panose="02040503050406030204" pitchFamily="18" charset="0"/>
-                          </a:rPr>
+                          <a:rPr lang="en-US" sz="2800" i="1"/>
                           <m:t>𝑛</m:t>
                         </m:r>
                         <m:r>
-                          <a:rPr lang="en-US" sz="1840" i="1">
-                            <a:latin typeface="Cambria Math" panose="02040503050406030204" pitchFamily="18" charset="0"/>
-                          </a:rPr>
+                          <a:rPr lang="en-US" sz="2800" i="1"/>
                           <m:t>−2</m:t>
                         </m:r>
                       </m:sub>
                     </m:sSub>
                     <m:r>
-                      <a:rPr lang="en-US" sz="1840" b="0" i="1" smtClean="0">
-                        <a:latin typeface="Cambria Math" panose="02040503050406030204" pitchFamily="18" charset="0"/>
-                      </a:rPr>
+                      <a:rPr lang="en-US" sz="2800" b="0" i="1" smtClean="0"/>
                       <m:t>,</m:t>
                     </m:r>
                     <m:sSub>
                       <m:sSubPr>
                         <m:ctrlPr>
-                          <a:rPr lang="en-US" sz="1840" i="1">
-                            <a:latin typeface="Cambria Math" panose="02040503050406030204" pitchFamily="18" charset="0"/>
-                          </a:rPr>
+                          <a:rPr lang="en-US" sz="2800" i="1"/>
                         </m:ctrlPr>
                       </m:sSubPr>
                       <m:e>
                         <m:r>
-                          <a:rPr lang="en-US" sz="1840" i="1">
-                            <a:latin typeface="Cambria Math" panose="02040503050406030204" pitchFamily="18" charset="0"/>
-                          </a:rPr>
+                          <a:rPr lang="en-US" sz="2800" i="1"/>
                           <m:t>𝑤</m:t>
                         </m:r>
                       </m:e>
                       <m:sub>
                         <m:r>
-                          <a:rPr lang="en-US" sz="1840" i="1">
-                            <a:latin typeface="Cambria Math" panose="02040503050406030204" pitchFamily="18" charset="0"/>
-                          </a:rPr>
+                          <a:rPr lang="en-US" sz="2800" i="1"/>
                           <m:t>𝑛</m:t>
                         </m:r>
                         <m:r>
-                          <a:rPr lang="en-US" sz="1840" i="1">
-                            <a:latin typeface="Cambria Math" panose="02040503050406030204" pitchFamily="18" charset="0"/>
-                          </a:rPr>
+                          <a:rPr lang="en-US" sz="2800" i="1"/>
                           <m:t>−3</m:t>
                         </m:r>
                       </m:sub>
                     </m:sSub>
                     <m:r>
-                      <a:rPr lang="en-US" sz="1840" b="0" i="1" smtClean="0">
-                        <a:latin typeface="Cambria Math" panose="02040503050406030204" pitchFamily="18" charset="0"/>
-                      </a:rPr>
+                      <a:rPr lang="en-US" sz="2800" b="0" i="1" smtClean="0"/>
                       <m:t>, …,</m:t>
                     </m:r>
                     <m:sSub>
                       <m:sSubPr>
                         <m:ctrlPr>
-                          <a:rPr lang="en-US" sz="1840" i="1">
-                            <a:latin typeface="Cambria Math" panose="02040503050406030204" pitchFamily="18" charset="0"/>
-                          </a:rPr>
+                          <a:rPr lang="en-US" sz="2800" i="1"/>
                         </m:ctrlPr>
                       </m:sSubPr>
                       <m:e>
                         <m:r>
-                          <a:rPr lang="en-US" sz="1840" i="1">
-                            <a:latin typeface="Cambria Math" panose="02040503050406030204" pitchFamily="18" charset="0"/>
-                          </a:rPr>
+                          <a:rPr lang="en-US" sz="2800" i="1"/>
                           <m:t>𝑤</m:t>
                         </m:r>
                       </m:e>
                       <m:sub>
                         <m:r>
-                          <a:rPr lang="en-US" sz="1840" i="1">
-                            <a:latin typeface="Cambria Math" panose="02040503050406030204" pitchFamily="18" charset="0"/>
-                          </a:rPr>
+                          <a:rPr lang="en-US" sz="2800" i="1"/>
                           <m:t>1</m:t>
                         </m:r>
                       </m:sub>
                     </m:sSub>
                     <m:r>
-                      <a:rPr lang="en-US" sz="1840" b="0" i="1" smtClean="0">
-                        <a:latin typeface="Cambria Math" panose="02040503050406030204" pitchFamily="18" charset="0"/>
-                      </a:rPr>
+                      <a:rPr lang="en-US" sz="2800" b="0" i="1" smtClean="0"/>
                       <m:t>) </m:t>
                     </m:r>
                     <m:r>
-                      <a:rPr lang="en-US" sz="1840" b="0" i="1" smtClean="0">
-                        <a:latin typeface="Cambria Math" panose="02040503050406030204" pitchFamily="18" charset="0"/>
+                      <a:rPr lang="en-US" sz="2800" b="0" i="1" smtClean="0">
                         <a:ea typeface="Cambria Math" panose="02040503050406030204" pitchFamily="18" charset="0"/>
                       </a:rPr>
                       <m:t>≈</m:t>
                     </m:r>
                     <m:r>
-                      <a:rPr lang="en-US" sz="1840" b="0" i="1" smtClean="0">
-                        <a:latin typeface="Cambria Math" panose="02040503050406030204" pitchFamily="18" charset="0"/>
+                      <a:rPr lang="en-US" sz="2800" b="0" i="1" smtClean="0">
                         <a:ea typeface="Cambria Math" panose="02040503050406030204" pitchFamily="18" charset="0"/>
                       </a:rPr>
                       <m:t>𝑃</m:t>
@@ -18710,33 +18634,25 @@
                       <m:dPr>
                         <m:endChr m:val="|"/>
                         <m:ctrlPr>
-                          <a:rPr lang="en-US" sz="1840" i="1">
-                            <a:latin typeface="Cambria Math" panose="02040503050406030204" pitchFamily="18" charset="0"/>
-                          </a:rPr>
+                          <a:rPr lang="en-US" sz="2800" i="1"/>
                         </m:ctrlPr>
                       </m:dPr>
                       <m:e>
                         <m:sSub>
                           <m:sSubPr>
                             <m:ctrlPr>
-                              <a:rPr lang="en-US" sz="1840" i="1">
-                                <a:latin typeface="Cambria Math" panose="02040503050406030204" pitchFamily="18" charset="0"/>
-                              </a:rPr>
+                              <a:rPr lang="en-US" sz="2800" i="1"/>
                             </m:ctrlPr>
                           </m:sSubPr>
                           <m:e>
                             <m:r>
-                              <a:rPr lang="en-US" sz="1840" i="1">
-                                <a:latin typeface="Cambria Math" panose="02040503050406030204" pitchFamily="18" charset="0"/>
-                              </a:rPr>
+                              <a:rPr lang="en-US" sz="2800" i="1"/>
                               <m:t>𝑤</m:t>
                             </m:r>
                           </m:e>
                           <m:sub>
                             <m:r>
-                              <a:rPr lang="en-US" sz="1840" i="1">
-                                <a:latin typeface="Cambria Math" panose="02040503050406030204" pitchFamily="18" charset="0"/>
-                              </a:rPr>
+                              <a:rPr lang="en-US" sz="2800" i="1"/>
                               <m:t>𝑛</m:t>
                             </m:r>
                           </m:sub>
@@ -18744,94 +18660,69 @@
                       </m:e>
                     </m:d>
                     <m:r>
-                      <a:rPr lang="en-US" sz="1840" i="1">
-                        <a:latin typeface="Cambria Math" panose="02040503050406030204" pitchFamily="18" charset="0"/>
-                      </a:rPr>
+                      <a:rPr lang="en-US" sz="2800" i="1"/>
                       <m:t> </m:t>
                     </m:r>
                     <m:sSub>
                       <m:sSubPr>
                         <m:ctrlPr>
-                          <a:rPr lang="en-US" sz="1840" i="1">
-                            <a:latin typeface="Cambria Math" panose="02040503050406030204" pitchFamily="18" charset="0"/>
-                          </a:rPr>
+                          <a:rPr lang="en-US" sz="2800" i="1"/>
                         </m:ctrlPr>
                       </m:sSubPr>
                       <m:e>
                         <m:r>
-                          <a:rPr lang="en-US" sz="1840" i="1">
-                            <a:latin typeface="Cambria Math" panose="02040503050406030204" pitchFamily="18" charset="0"/>
-                          </a:rPr>
+                          <a:rPr lang="en-US" sz="2800" i="1"/>
                           <m:t>𝑤</m:t>
                         </m:r>
                       </m:e>
                       <m:sub>
                         <m:r>
-                          <a:rPr lang="en-US" sz="1840" i="1">
-                            <a:latin typeface="Cambria Math" panose="02040503050406030204" pitchFamily="18" charset="0"/>
-                          </a:rPr>
+                          <a:rPr lang="en-US" sz="2800" i="1"/>
                           <m:t>𝑛</m:t>
                         </m:r>
                         <m:r>
-                          <a:rPr lang="en-US" sz="1840" i="1">
-                            <a:latin typeface="Cambria Math" panose="02040503050406030204" pitchFamily="18" charset="0"/>
-                          </a:rPr>
+                          <a:rPr lang="en-US" sz="2800" i="1"/>
                           <m:t>−1</m:t>
                         </m:r>
                       </m:sub>
                     </m:sSub>
                     <m:r>
-                      <a:rPr lang="en-US" sz="1840" i="1">
-                        <a:latin typeface="Cambria Math" panose="02040503050406030204" pitchFamily="18" charset="0"/>
-                      </a:rPr>
+                      <a:rPr lang="en-US" sz="2800" i="1"/>
                       <m:t>, …,</m:t>
                     </m:r>
                     <m:sSub>
                       <m:sSubPr>
                         <m:ctrlPr>
-                          <a:rPr lang="en-US" sz="1840" i="1">
-                            <a:latin typeface="Cambria Math" panose="02040503050406030204" pitchFamily="18" charset="0"/>
-                          </a:rPr>
+                          <a:rPr lang="en-US" sz="2800" i="1"/>
                         </m:ctrlPr>
                       </m:sSubPr>
                       <m:e>
                         <m:r>
-                          <a:rPr lang="en-US" sz="1840" i="1">
-                            <a:latin typeface="Cambria Math" panose="02040503050406030204" pitchFamily="18" charset="0"/>
-                          </a:rPr>
+                          <a:rPr lang="en-US" sz="2800" i="1"/>
                           <m:t>𝑤</m:t>
                         </m:r>
                       </m:e>
                       <m:sub>
                         <m:r>
-                          <a:rPr lang="en-US" sz="1840" b="0" i="1" smtClean="0">
-                            <a:latin typeface="Cambria Math" panose="02040503050406030204" pitchFamily="18" charset="0"/>
-                          </a:rPr>
+                          <a:rPr lang="en-US" sz="2800" b="0" i="1" smtClean="0"/>
                           <m:t>𝑛</m:t>
                         </m:r>
                         <m:r>
-                          <a:rPr lang="en-US" sz="1840" b="0" i="1" smtClean="0">
-                            <a:latin typeface="Cambria Math" panose="02040503050406030204" pitchFamily="18" charset="0"/>
-                          </a:rPr>
+                          <a:rPr lang="en-US" sz="2800" b="0" i="1" smtClean="0"/>
                           <m:t>−</m:t>
                         </m:r>
                         <m:r>
-                          <a:rPr lang="en-US" sz="1840" b="0" i="1" smtClean="0">
-                            <a:latin typeface="Cambria Math" panose="02040503050406030204" pitchFamily="18" charset="0"/>
-                          </a:rPr>
+                          <a:rPr lang="en-US" sz="2800" b="0" i="1" smtClean="0"/>
                           <m:t>𝑁</m:t>
                         </m:r>
                         <m:r>
-                          <a:rPr lang="en-US" sz="1840" b="0" i="1" smtClean="0">
-                            <a:latin typeface="Cambria Math" panose="02040503050406030204" pitchFamily="18" charset="0"/>
-                          </a:rPr>
+                          <a:rPr lang="en-US" sz="2800" b="0" i="1" smtClean="0"/>
                           <m:t>+1</m:t>
                         </m:r>
                       </m:sub>
                     </m:sSub>
                     <m:r>
-                      <a:rPr lang="en-US" sz="1840" b="0" i="1" smtClean="0">
-                        <a:latin typeface="Cambria Math" panose="02040503050406030204" pitchFamily="18" charset="0"/>
+                      <a:rPr lang="en-US" sz="2800" b="0" i="1" smtClean="0">
                         <a:ea typeface="Cambria Math" panose="02040503050406030204" pitchFamily="18" charset="0"/>
                       </a:rPr>
                       <m:t>)</m:t>
@@ -18839,15 +18730,13 @@
                   </m:oMath>
                 </a14:m>
                 <a:r>
-                  <a:rPr lang="en-US" sz="1840" dirty="0"/>
+                  <a:rPr lang="en-US" sz="2800" dirty="0"/>
                   <a:t> </a:t>
                 </a:r>
               </a:p>
               <a:p>
                 <a:r>
-                  <a:rPr lang="en-US" sz="2800" dirty="0">
-                    <a:latin typeface="Cambria Math" panose="02040503050406030204" pitchFamily="18" charset="0"/>
-                  </a:rPr>
+                  <a:rPr lang="en-US" sz="2800" dirty="0"/>
                   <a:t>We use likelihood estimators to score our N-grams</a:t>
                 </a:r>
               </a:p>
@@ -18879,13 +18768,13 @@
             </p:nvSpPr>
             <p:spPr>
               <a:xfrm>
-                <a:off x="15544800" y="7759946"/>
+                <a:off x="15890528" y="15896176"/>
                 <a:ext cx="12801600" cy="4104191"/>
               </a:xfrm>
               <a:blipFill>
                 <a:blip r:embed="rId3"/>
                 <a:stretch>
-                  <a:fillRect l="-1091" r="-496"/>
+                  <a:fillRect l="-892"/>
                 </a:stretch>
               </a:blipFill>
             </p:spPr>
@@ -18914,14 +18803,19 @@
             <p:ph type="body" sz="quarter" idx="29"/>
           </p:nvPr>
         </p:nvSpPr>
-        <p:spPr/>
+        <p:spPr>
+          <a:xfrm>
+            <a:off x="15890528" y="5852160"/>
+            <a:ext cx="12801600" cy="1219200"/>
+          </a:xfrm>
+        </p:spPr>
         <p:txBody>
           <a:bodyPr/>
           <a:lstStyle/>
           <a:p>
             <a:r>
               <a:rPr lang="en-US" dirty="0"/>
-              <a:t>Another section</a:t>
+              <a:t>placeholders</a:t>
             </a:r>
           </a:p>
         </p:txBody>
@@ -19251,7 +19145,7 @@
         </p:nvSpPr>
         <p:spPr>
           <a:xfrm>
-            <a:off x="1213247" y="27443097"/>
+            <a:off x="1263527" y="28458094"/>
             <a:ext cx="12661106" cy="1303867"/>
           </a:xfrm>
           <a:prstGeom prst="rect">
@@ -19497,7 +19391,7 @@
         </p:blipFill>
         <p:spPr>
           <a:xfrm>
-            <a:off x="2467719" y="21188115"/>
+            <a:off x="2517999" y="22203112"/>
             <a:ext cx="10125122" cy="6254982"/>
           </a:xfrm>
           <a:prstGeom prst="rect">
@@ -19521,7 +19415,7 @@
         </p:nvSpPr>
         <p:spPr>
           <a:xfrm>
-            <a:off x="15521940" y="5987264"/>
+            <a:off x="15867668" y="14123494"/>
             <a:ext cx="12801600" cy="1219200"/>
           </a:xfrm>
           <a:prstGeom prst="round1Rect">
@@ -19729,7 +19623,7 @@
           <a:p>
             <a:r>
               <a:rPr lang="en-US" dirty="0"/>
-              <a:t>N-gram Models</a:t>
+              <a:t>N-gram Model</a:t>
             </a:r>
           </a:p>
         </p:txBody>
@@ -19763,7 +19657,7 @@
         </p:blipFill>
         <p:spPr bwMode="auto">
           <a:xfrm>
-            <a:off x="7993627" y="8836862"/>
+            <a:off x="8146026" y="7473315"/>
             <a:ext cx="6061910" cy="4068150"/>
           </a:xfrm>
           <a:prstGeom prst="rect">
@@ -21300,7 +21194,7 @@
         </p:nvSpPr>
         <p:spPr>
           <a:xfrm>
-            <a:off x="15517514" y="12295412"/>
+            <a:off x="15863242" y="20431642"/>
             <a:ext cx="12801600" cy="1219200"/>
           </a:xfrm>
           <a:prstGeom prst="round1Rect">
@@ -21525,10 +21419,9 @@
           </a:lstStyle>
           <a:p>
             <a:r>
-              <a:rPr lang="en-US"/>
-              <a:t>methods</a:t>
+              <a:rPr lang="en-US" dirty="0"/>
+              <a:t>Testing methodology</a:t>
             </a:r>
-            <a:endParaRPr lang="en-US" dirty="0"/>
           </a:p>
         </p:txBody>
       </p:sp>
@@ -21548,8 +21441,8 @@
         </p:nvSpPr>
         <p:spPr>
           <a:xfrm>
-            <a:off x="15297027" y="13883300"/>
-            <a:ext cx="12801600" cy="5029225"/>
+            <a:off x="15642755" y="22019531"/>
+            <a:ext cx="12801600" cy="5423566"/>
           </a:xfrm>
           <a:prstGeom prst="rect">
             <a:avLst/>
@@ -21774,10 +21667,9 @@
               <a:buNone/>
             </a:pPr>
             <a:r>
-              <a:rPr lang="en-US" sz="2800"/>
+              <a:rPr lang="en-US" sz="2800" dirty="0"/>
               <a:t>We applied our framework to Cisco configurations of core, border, and distribution routers from three large university networks. To test the accuracy of our model, we perform leave-one- out cross validation: one (set of) configuration(s) is used for testing and the remainder are used for training. We “rebuild” the test configuration(s) token-by-token by using our n-gram model to predict the next token based on the prior n-1 tokens; we do not predict across lines. A prediction is marked as successful when the actual next token in the configuration is within the top three results generated by the model. </a:t>
             </a:r>
-            <a:endParaRPr lang="en-US" sz="2800" dirty="0"/>
           </a:p>
         </p:txBody>
       </p:sp>
@@ -21796,13 +21688,13 @@
           <p:nvPr>
             <p:extLst>
               <p:ext uri="{D42A27DB-BD31-4B8C-83A1-F6EECF244321}">
-                <p14:modId xmlns:p14="http://schemas.microsoft.com/office/powerpoint/2010/main" val="2697361229"/>
+                <p14:modId xmlns:p14="http://schemas.microsoft.com/office/powerpoint/2010/main" val="2068573792"/>
               </p:ext>
             </p:extLst>
           </p:nvPr>
         </p:nvGraphicFramePr>
         <p:xfrm>
-          <a:off x="15297027" y="19298280"/>
+          <a:off x="15642755" y="27434510"/>
           <a:ext cx="12801600" cy="3531573"/>
         </p:xfrm>
         <a:graphic>
@@ -22111,7 +22003,7 @@
         </p:nvSpPr>
         <p:spPr>
           <a:xfrm>
-            <a:off x="15199072" y="23262557"/>
+            <a:off x="15544800" y="31398787"/>
             <a:ext cx="12801600" cy="954107"/>
           </a:xfrm>
           <a:prstGeom prst="rect">
@@ -22206,6 +22098,521 @@
             <a:r>
               <a:rPr lang="en-US" sz="7200" dirty="0"/>
               <a:t>Colgate University</a:t>
+            </a:r>
+          </a:p>
+        </p:txBody>
+      </p:sp>
+      <p:sp>
+        <p:nvSpPr>
+          <p:cNvPr id="37" name="Content Placeholder 10">
+            <a:extLst>
+              <a:ext uri="{FF2B5EF4-FFF2-40B4-BE49-F238E27FC236}">
+                <a16:creationId xmlns:a16="http://schemas.microsoft.com/office/drawing/2014/main" id="{82BA6058-3987-3A4F-98AC-2803CB04620E}"/>
+              </a:ext>
+            </a:extLst>
+          </p:cNvPr>
+          <p:cNvSpPr txBox="1">
+            <a:spLocks/>
+          </p:cNvSpPr>
+          <p:nvPr/>
+        </p:nvSpPr>
+        <p:spPr>
+          <a:xfrm>
+            <a:off x="1258705" y="7473315"/>
+            <a:ext cx="6710132" cy="5090775"/>
+          </a:xfrm>
+          <a:prstGeom prst="rect">
+            <a:avLst/>
+          </a:prstGeom>
+        </p:spPr>
+        <p:txBody>
+          <a:bodyPr vert="horz" lIns="365760" tIns="182880" rIns="91440" bIns="45720" rtlCol="0">
+            <a:noAutofit/>
+          </a:bodyPr>
+          <a:lstStyle>
+            <a:lvl1pPr marL="822960" indent="-822960" algn="l" defTabSz="3291840" rtl="0" eaLnBrk="1" latinLnBrk="0" hangingPunct="1">
+              <a:lnSpc>
+                <a:spcPct val="120000"/>
+              </a:lnSpc>
+              <a:spcBef>
+                <a:spcPts val="3600"/>
+              </a:spcBef>
+              <a:buClr>
+                <a:schemeClr val="accent1"/>
+              </a:buClr>
+              <a:buSzPct val="110000"/>
+              <a:buFont typeface="Wingdings" panose="05000000000000000000" pitchFamily="2" charset="2"/>
+              <a:buChar char="§"/>
+              <a:defRPr sz="7680" kern="1200" baseline="0">
+                <a:solidFill>
+                  <a:schemeClr val="tx1"/>
+                </a:solidFill>
+                <a:effectLst/>
+                <a:latin typeface="+mn-lt"/>
+                <a:ea typeface="+mn-ea"/>
+                <a:cs typeface="+mn-cs"/>
+              </a:defRPr>
+            </a:lvl1pPr>
+            <a:lvl2pPr marL="2468880" indent="-822960" algn="l" defTabSz="3291840" rtl="0" eaLnBrk="1" latinLnBrk="0" hangingPunct="1">
+              <a:lnSpc>
+                <a:spcPct val="120000"/>
+              </a:lnSpc>
+              <a:spcBef>
+                <a:spcPts val="1800"/>
+              </a:spcBef>
+              <a:buClr>
+                <a:schemeClr val="accent1"/>
+              </a:buClr>
+              <a:buSzPct val="110000"/>
+              <a:buFont typeface="Wingdings" panose="05000000000000000000" pitchFamily="2" charset="2"/>
+              <a:buChar char="§"/>
+              <a:defRPr sz="6720" kern="1200">
+                <a:solidFill>
+                  <a:schemeClr val="tx1"/>
+                </a:solidFill>
+                <a:effectLst/>
+                <a:latin typeface="+mn-lt"/>
+                <a:ea typeface="+mn-ea"/>
+                <a:cs typeface="+mn-cs"/>
+              </a:defRPr>
+            </a:lvl2pPr>
+            <a:lvl3pPr marL="4114800" indent="-822960" algn="l" defTabSz="3291840" rtl="0" eaLnBrk="1" latinLnBrk="0" hangingPunct="1">
+              <a:lnSpc>
+                <a:spcPct val="120000"/>
+              </a:lnSpc>
+              <a:spcBef>
+                <a:spcPts val="1800"/>
+              </a:spcBef>
+              <a:buClr>
+                <a:schemeClr val="accent1"/>
+              </a:buClr>
+              <a:buSzPct val="110000"/>
+              <a:buFont typeface="Wingdings" panose="05000000000000000000" pitchFamily="2" charset="2"/>
+              <a:buChar char="§"/>
+              <a:defRPr sz="5760" kern="1200">
+                <a:solidFill>
+                  <a:schemeClr val="tx1"/>
+                </a:solidFill>
+                <a:effectLst/>
+                <a:latin typeface="+mn-lt"/>
+                <a:ea typeface="+mn-ea"/>
+                <a:cs typeface="+mn-cs"/>
+              </a:defRPr>
+            </a:lvl3pPr>
+            <a:lvl4pPr marL="5760720" indent="-822960" algn="l" defTabSz="3291840" rtl="0" eaLnBrk="1" latinLnBrk="0" hangingPunct="1">
+              <a:lnSpc>
+                <a:spcPct val="120000"/>
+              </a:lnSpc>
+              <a:spcBef>
+                <a:spcPts val="1800"/>
+              </a:spcBef>
+              <a:buClr>
+                <a:schemeClr val="accent1"/>
+              </a:buClr>
+              <a:buSzPct val="110000"/>
+              <a:buFont typeface="Wingdings" panose="05000000000000000000" pitchFamily="2" charset="2"/>
+              <a:buChar char="§"/>
+              <a:defRPr sz="5760" kern="1200">
+                <a:solidFill>
+                  <a:schemeClr val="tx1"/>
+                </a:solidFill>
+                <a:effectLst/>
+                <a:latin typeface="+mn-lt"/>
+                <a:ea typeface="+mn-ea"/>
+                <a:cs typeface="+mn-cs"/>
+              </a:defRPr>
+            </a:lvl4pPr>
+            <a:lvl5pPr marL="7406640" indent="-822960" algn="l" defTabSz="3291840" rtl="0" eaLnBrk="1" latinLnBrk="0" hangingPunct="1">
+              <a:lnSpc>
+                <a:spcPct val="120000"/>
+              </a:lnSpc>
+              <a:spcBef>
+                <a:spcPts val="1800"/>
+              </a:spcBef>
+              <a:buClr>
+                <a:schemeClr val="accent1"/>
+              </a:buClr>
+              <a:buSzPct val="110000"/>
+              <a:buFont typeface="Wingdings" panose="05000000000000000000" pitchFamily="2" charset="2"/>
+              <a:buChar char="§"/>
+              <a:defRPr sz="5760" kern="1200">
+                <a:solidFill>
+                  <a:schemeClr val="tx1"/>
+                </a:solidFill>
+                <a:effectLst/>
+                <a:latin typeface="+mn-lt"/>
+                <a:ea typeface="+mn-ea"/>
+                <a:cs typeface="+mn-cs"/>
+              </a:defRPr>
+            </a:lvl5pPr>
+            <a:lvl6pPr marL="9052560" indent="-822960" algn="l" defTabSz="3291840" rtl="0" eaLnBrk="1" latinLnBrk="0" hangingPunct="1">
+              <a:lnSpc>
+                <a:spcPct val="120000"/>
+              </a:lnSpc>
+              <a:spcBef>
+                <a:spcPts val="1800"/>
+              </a:spcBef>
+              <a:buClr>
+                <a:schemeClr val="accent1"/>
+              </a:buClr>
+              <a:buSzPct val="110000"/>
+              <a:buFont typeface="Wingdings" panose="05000000000000000000" pitchFamily="2" charset="2"/>
+              <a:buChar char="§"/>
+              <a:defRPr sz="4320" kern="1200">
+                <a:solidFill>
+                  <a:schemeClr val="tx1"/>
+                </a:solidFill>
+                <a:effectLst/>
+                <a:latin typeface="+mn-lt"/>
+                <a:ea typeface="+mn-ea"/>
+                <a:cs typeface="+mn-cs"/>
+              </a:defRPr>
+            </a:lvl6pPr>
+            <a:lvl7pPr marL="10698480" indent="-822960" algn="l" defTabSz="3291840" rtl="0" eaLnBrk="1" latinLnBrk="0" hangingPunct="1">
+              <a:lnSpc>
+                <a:spcPct val="120000"/>
+              </a:lnSpc>
+              <a:spcBef>
+                <a:spcPts val="1800"/>
+              </a:spcBef>
+              <a:buClr>
+                <a:schemeClr val="accent1"/>
+              </a:buClr>
+              <a:buSzPct val="110000"/>
+              <a:buFont typeface="Wingdings" panose="05000000000000000000" pitchFamily="2" charset="2"/>
+              <a:buChar char="§"/>
+              <a:defRPr sz="4320" kern="1200">
+                <a:solidFill>
+                  <a:schemeClr val="tx1"/>
+                </a:solidFill>
+                <a:effectLst/>
+                <a:latin typeface="+mn-lt"/>
+                <a:ea typeface="+mn-ea"/>
+                <a:cs typeface="+mn-cs"/>
+              </a:defRPr>
+            </a:lvl7pPr>
+            <a:lvl8pPr marL="12344400" indent="-822960" algn="l" defTabSz="3291840" rtl="0" eaLnBrk="1" latinLnBrk="0" hangingPunct="1">
+              <a:lnSpc>
+                <a:spcPct val="120000"/>
+              </a:lnSpc>
+              <a:spcBef>
+                <a:spcPts val="1800"/>
+              </a:spcBef>
+              <a:buClr>
+                <a:schemeClr val="accent1"/>
+              </a:buClr>
+              <a:buSzPct val="110000"/>
+              <a:buFont typeface="Wingdings" panose="05000000000000000000" pitchFamily="2" charset="2"/>
+              <a:buChar char="§"/>
+              <a:defRPr sz="4320" kern="1200">
+                <a:solidFill>
+                  <a:schemeClr val="tx1"/>
+                </a:solidFill>
+                <a:effectLst/>
+                <a:latin typeface="+mn-lt"/>
+                <a:ea typeface="+mn-ea"/>
+                <a:cs typeface="+mn-cs"/>
+              </a:defRPr>
+            </a:lvl8pPr>
+            <a:lvl9pPr marL="13990320" indent="-822960" algn="l" defTabSz="3291840" rtl="0" eaLnBrk="1" latinLnBrk="0" hangingPunct="1">
+              <a:lnSpc>
+                <a:spcPct val="120000"/>
+              </a:lnSpc>
+              <a:spcBef>
+                <a:spcPts val="1800"/>
+              </a:spcBef>
+              <a:buClr>
+                <a:schemeClr val="accent1"/>
+              </a:buClr>
+              <a:buSzPct val="110000"/>
+              <a:buFont typeface="Wingdings" panose="05000000000000000000" pitchFamily="2" charset="2"/>
+              <a:buChar char="§"/>
+              <a:defRPr sz="4320" kern="1200">
+                <a:solidFill>
+                  <a:schemeClr val="tx1"/>
+                </a:solidFill>
+                <a:effectLst/>
+                <a:latin typeface="+mn-lt"/>
+                <a:ea typeface="+mn-ea"/>
+                <a:cs typeface="+mn-cs"/>
+              </a:defRPr>
+            </a:lvl9pPr>
+          </a:lstStyle>
+          <a:p>
+            <a:r>
+              <a:rPr lang="en-US" sz="2800" dirty="0"/>
+              <a:t>Configurations are often complex, consisting of thousands of lines of low-level directives and dozens of symbolic references</a:t>
+            </a:r>
+          </a:p>
+          <a:p>
+            <a:r>
+              <a:rPr lang="en-US" sz="2800" dirty="0"/>
+              <a:t>Configuration errors are common and the leading cause of network outages</a:t>
+            </a:r>
+          </a:p>
+        </p:txBody>
+      </p:sp>
+      <p:sp>
+        <p:nvSpPr>
+          <p:cNvPr id="38" name="Content Placeholder 10">
+            <a:extLst>
+              <a:ext uri="{FF2B5EF4-FFF2-40B4-BE49-F238E27FC236}">
+                <a16:creationId xmlns:a16="http://schemas.microsoft.com/office/drawing/2014/main" id="{B2EF5C78-F466-1E40-BA54-F0A9BEACCBEA}"/>
+              </a:ext>
+            </a:extLst>
+          </p:cNvPr>
+          <p:cNvSpPr txBox="1">
+            <a:spLocks/>
+          </p:cNvSpPr>
+          <p:nvPr/>
+        </p:nvSpPr>
+        <p:spPr>
+          <a:xfrm>
+            <a:off x="15891709" y="7440050"/>
+            <a:ext cx="12107781" cy="4101415"/>
+          </a:xfrm>
+          <a:prstGeom prst="rect">
+            <a:avLst/>
+          </a:prstGeom>
+        </p:spPr>
+        <p:txBody>
+          <a:bodyPr vert="horz" lIns="365760" tIns="182880" rIns="91440" bIns="45720" rtlCol="0">
+            <a:noAutofit/>
+          </a:bodyPr>
+          <a:lstStyle>
+            <a:lvl1pPr marL="822960" indent="-822960" algn="l" defTabSz="3291840" rtl="0" eaLnBrk="1" latinLnBrk="0" hangingPunct="1">
+              <a:lnSpc>
+                <a:spcPct val="120000"/>
+              </a:lnSpc>
+              <a:spcBef>
+                <a:spcPts val="3600"/>
+              </a:spcBef>
+              <a:buClr>
+                <a:schemeClr val="accent1"/>
+              </a:buClr>
+              <a:buSzPct val="110000"/>
+              <a:buFont typeface="Wingdings" panose="05000000000000000000" pitchFamily="2" charset="2"/>
+              <a:buChar char="§"/>
+              <a:defRPr sz="7680" kern="1200" baseline="0">
+                <a:solidFill>
+                  <a:schemeClr val="tx1"/>
+                </a:solidFill>
+                <a:effectLst/>
+                <a:latin typeface="+mn-lt"/>
+                <a:ea typeface="+mn-ea"/>
+                <a:cs typeface="+mn-cs"/>
+              </a:defRPr>
+            </a:lvl1pPr>
+            <a:lvl2pPr marL="2468880" indent="-822960" algn="l" defTabSz="3291840" rtl="0" eaLnBrk="1" latinLnBrk="0" hangingPunct="1">
+              <a:lnSpc>
+                <a:spcPct val="120000"/>
+              </a:lnSpc>
+              <a:spcBef>
+                <a:spcPts val="1800"/>
+              </a:spcBef>
+              <a:buClr>
+                <a:schemeClr val="accent1"/>
+              </a:buClr>
+              <a:buSzPct val="110000"/>
+              <a:buFont typeface="Wingdings" panose="05000000000000000000" pitchFamily="2" charset="2"/>
+              <a:buChar char="§"/>
+              <a:defRPr sz="6720" kern="1200">
+                <a:solidFill>
+                  <a:schemeClr val="tx1"/>
+                </a:solidFill>
+                <a:effectLst/>
+                <a:latin typeface="+mn-lt"/>
+                <a:ea typeface="+mn-ea"/>
+                <a:cs typeface="+mn-cs"/>
+              </a:defRPr>
+            </a:lvl2pPr>
+            <a:lvl3pPr marL="4114800" indent="-822960" algn="l" defTabSz="3291840" rtl="0" eaLnBrk="1" latinLnBrk="0" hangingPunct="1">
+              <a:lnSpc>
+                <a:spcPct val="120000"/>
+              </a:lnSpc>
+              <a:spcBef>
+                <a:spcPts val="1800"/>
+              </a:spcBef>
+              <a:buClr>
+                <a:schemeClr val="accent1"/>
+              </a:buClr>
+              <a:buSzPct val="110000"/>
+              <a:buFont typeface="Wingdings" panose="05000000000000000000" pitchFamily="2" charset="2"/>
+              <a:buChar char="§"/>
+              <a:defRPr sz="5760" kern="1200">
+                <a:solidFill>
+                  <a:schemeClr val="tx1"/>
+                </a:solidFill>
+                <a:effectLst/>
+                <a:latin typeface="+mn-lt"/>
+                <a:ea typeface="+mn-ea"/>
+                <a:cs typeface="+mn-cs"/>
+              </a:defRPr>
+            </a:lvl3pPr>
+            <a:lvl4pPr marL="5760720" indent="-822960" algn="l" defTabSz="3291840" rtl="0" eaLnBrk="1" latinLnBrk="0" hangingPunct="1">
+              <a:lnSpc>
+                <a:spcPct val="120000"/>
+              </a:lnSpc>
+              <a:spcBef>
+                <a:spcPts val="1800"/>
+              </a:spcBef>
+              <a:buClr>
+                <a:schemeClr val="accent1"/>
+              </a:buClr>
+              <a:buSzPct val="110000"/>
+              <a:buFont typeface="Wingdings" panose="05000000000000000000" pitchFamily="2" charset="2"/>
+              <a:buChar char="§"/>
+              <a:defRPr sz="5760" kern="1200">
+                <a:solidFill>
+                  <a:schemeClr val="tx1"/>
+                </a:solidFill>
+                <a:effectLst/>
+                <a:latin typeface="+mn-lt"/>
+                <a:ea typeface="+mn-ea"/>
+                <a:cs typeface="+mn-cs"/>
+              </a:defRPr>
+            </a:lvl4pPr>
+            <a:lvl5pPr marL="7406640" indent="-822960" algn="l" defTabSz="3291840" rtl="0" eaLnBrk="1" latinLnBrk="0" hangingPunct="1">
+              <a:lnSpc>
+                <a:spcPct val="120000"/>
+              </a:lnSpc>
+              <a:spcBef>
+                <a:spcPts val="1800"/>
+              </a:spcBef>
+              <a:buClr>
+                <a:schemeClr val="accent1"/>
+              </a:buClr>
+              <a:buSzPct val="110000"/>
+              <a:buFont typeface="Wingdings" panose="05000000000000000000" pitchFamily="2" charset="2"/>
+              <a:buChar char="§"/>
+              <a:defRPr sz="5760" kern="1200">
+                <a:solidFill>
+                  <a:schemeClr val="tx1"/>
+                </a:solidFill>
+                <a:effectLst/>
+                <a:latin typeface="+mn-lt"/>
+                <a:ea typeface="+mn-ea"/>
+                <a:cs typeface="+mn-cs"/>
+              </a:defRPr>
+            </a:lvl5pPr>
+            <a:lvl6pPr marL="9052560" indent="-822960" algn="l" defTabSz="3291840" rtl="0" eaLnBrk="1" latinLnBrk="0" hangingPunct="1">
+              <a:lnSpc>
+                <a:spcPct val="120000"/>
+              </a:lnSpc>
+              <a:spcBef>
+                <a:spcPts val="1800"/>
+              </a:spcBef>
+              <a:buClr>
+                <a:schemeClr val="accent1"/>
+              </a:buClr>
+              <a:buSzPct val="110000"/>
+              <a:buFont typeface="Wingdings" panose="05000000000000000000" pitchFamily="2" charset="2"/>
+              <a:buChar char="§"/>
+              <a:defRPr sz="4320" kern="1200">
+                <a:solidFill>
+                  <a:schemeClr val="tx1"/>
+                </a:solidFill>
+                <a:effectLst/>
+                <a:latin typeface="+mn-lt"/>
+                <a:ea typeface="+mn-ea"/>
+                <a:cs typeface="+mn-cs"/>
+              </a:defRPr>
+            </a:lvl6pPr>
+            <a:lvl7pPr marL="10698480" indent="-822960" algn="l" defTabSz="3291840" rtl="0" eaLnBrk="1" latinLnBrk="0" hangingPunct="1">
+              <a:lnSpc>
+                <a:spcPct val="120000"/>
+              </a:lnSpc>
+              <a:spcBef>
+                <a:spcPts val="1800"/>
+              </a:spcBef>
+              <a:buClr>
+                <a:schemeClr val="accent1"/>
+              </a:buClr>
+              <a:buSzPct val="110000"/>
+              <a:buFont typeface="Wingdings" panose="05000000000000000000" pitchFamily="2" charset="2"/>
+              <a:buChar char="§"/>
+              <a:defRPr sz="4320" kern="1200">
+                <a:solidFill>
+                  <a:schemeClr val="tx1"/>
+                </a:solidFill>
+                <a:effectLst/>
+                <a:latin typeface="+mn-lt"/>
+                <a:ea typeface="+mn-ea"/>
+                <a:cs typeface="+mn-cs"/>
+              </a:defRPr>
+            </a:lvl7pPr>
+            <a:lvl8pPr marL="12344400" indent="-822960" algn="l" defTabSz="3291840" rtl="0" eaLnBrk="1" latinLnBrk="0" hangingPunct="1">
+              <a:lnSpc>
+                <a:spcPct val="120000"/>
+              </a:lnSpc>
+              <a:spcBef>
+                <a:spcPts val="1800"/>
+              </a:spcBef>
+              <a:buClr>
+                <a:schemeClr val="accent1"/>
+              </a:buClr>
+              <a:buSzPct val="110000"/>
+              <a:buFont typeface="Wingdings" panose="05000000000000000000" pitchFamily="2" charset="2"/>
+              <a:buChar char="§"/>
+              <a:defRPr sz="4320" kern="1200">
+                <a:solidFill>
+                  <a:schemeClr val="tx1"/>
+                </a:solidFill>
+                <a:effectLst/>
+                <a:latin typeface="+mn-lt"/>
+                <a:ea typeface="+mn-ea"/>
+                <a:cs typeface="+mn-cs"/>
+              </a:defRPr>
+            </a:lvl8pPr>
+            <a:lvl9pPr marL="13990320" indent="-822960" algn="l" defTabSz="3291840" rtl="0" eaLnBrk="1" latinLnBrk="0" hangingPunct="1">
+              <a:lnSpc>
+                <a:spcPct val="120000"/>
+              </a:lnSpc>
+              <a:spcBef>
+                <a:spcPts val="1800"/>
+              </a:spcBef>
+              <a:buClr>
+                <a:schemeClr val="accent1"/>
+              </a:buClr>
+              <a:buSzPct val="110000"/>
+              <a:buFont typeface="Wingdings" panose="05000000000000000000" pitchFamily="2" charset="2"/>
+              <a:buChar char="§"/>
+              <a:defRPr sz="4320" kern="1200">
+                <a:solidFill>
+                  <a:schemeClr val="tx1"/>
+                </a:solidFill>
+                <a:effectLst/>
+                <a:latin typeface="+mn-lt"/>
+                <a:ea typeface="+mn-ea"/>
+                <a:cs typeface="+mn-cs"/>
+              </a:defRPr>
+            </a:lvl9pPr>
+          </a:lstStyle>
+          <a:p>
+            <a:r>
+              <a:rPr lang="en-US" sz="2800" dirty="0"/>
+              <a:t>We employ a networking- specific optimization predicated by our observation that IP prefixes are often unique to devices </a:t>
+            </a:r>
+          </a:p>
+          <a:p>
+            <a:r>
+              <a:rPr lang="en-US" sz="2800" dirty="0"/>
+              <a:t>We replace these prefixes and certain other tokens with generic PREFIX tokens</a:t>
+            </a:r>
+          </a:p>
+          <a:p>
+            <a:r>
+              <a:rPr lang="en-US" sz="2800" dirty="0"/>
+              <a:t>With placeholder optimization, our accuracy increases by 5%</a:t>
+            </a:r>
+          </a:p>
+          <a:p>
+            <a:endParaRPr lang="en-US" sz="2800" dirty="0"/>
+          </a:p>
+          <a:p>
+            <a:r>
+              <a:rPr lang="en-US" sz="2800" dirty="0"/>
+              <a:t>IMAGE?</a:t>
             </a:r>
           </a:p>
         </p:txBody>
@@ -23003,142 +23410,6 @@
 </file>
 
 <file path=customXml/item1.xml><?xml version="1.0" encoding="utf-8"?>
-<p:properties xmlns:p="http://schemas.microsoft.com/office/2006/metadata/properties" xmlns:xsi="http://www.w3.org/2001/XMLSchema-instance" xmlns:pc="http://schemas.microsoft.com/office/infopath/2007/PartnerControls">
-  <documentManagement>
-    <DirectSourceMarket xmlns="4873beb7-5857-4685-be1f-d57550cc96cc" xsi:nil="true"/>
-    <ApprovalStatus xmlns="4873beb7-5857-4685-be1f-d57550cc96cc">InProgress</ApprovalStatus>
-    <MarketSpecific xmlns="4873beb7-5857-4685-be1f-d57550cc96cc">false</MarketSpecific>
-    <LocComments xmlns="4873beb7-5857-4685-be1f-d57550cc96cc" xsi:nil="true"/>
-    <ThumbnailAssetId xmlns="4873beb7-5857-4685-be1f-d57550cc96cc" xsi:nil="true"/>
-    <PrimaryImageGen xmlns="4873beb7-5857-4685-be1f-d57550cc96cc">true</PrimaryImageGen>
-    <LegacyData xmlns="4873beb7-5857-4685-be1f-d57550cc96cc" xsi:nil="true"/>
-    <LocRecommendedHandoff xmlns="4873beb7-5857-4685-be1f-d57550cc96cc" xsi:nil="true"/>
-    <BusinessGroup xmlns="4873beb7-5857-4685-be1f-d57550cc96cc" xsi:nil="true"/>
-    <BlockPublish xmlns="4873beb7-5857-4685-be1f-d57550cc96cc">false</BlockPublish>
-    <TPFriendlyName xmlns="4873beb7-5857-4685-be1f-d57550cc96cc" xsi:nil="true"/>
-    <NumericId xmlns="4873beb7-5857-4685-be1f-d57550cc96cc" xsi:nil="true"/>
-    <APEditor xmlns="4873beb7-5857-4685-be1f-d57550cc96cc">
-      <UserInfo>
-        <DisplayName/>
-        <AccountId xsi:nil="true"/>
-        <AccountType/>
-      </UserInfo>
-    </APEditor>
-    <SourceTitle xmlns="4873beb7-5857-4685-be1f-d57550cc96cc" xsi:nil="true"/>
-    <OpenTemplate xmlns="4873beb7-5857-4685-be1f-d57550cc96cc">true</OpenTemplate>
-    <UALocComments xmlns="4873beb7-5857-4685-be1f-d57550cc96cc" xsi:nil="true"/>
-    <ParentAssetId xmlns="4873beb7-5857-4685-be1f-d57550cc96cc" xsi:nil="true"/>
-    <IntlLangReviewDate xmlns="4873beb7-5857-4685-be1f-d57550cc96cc" xsi:nil="true"/>
-    <FeatureTagsTaxHTField0 xmlns="4873beb7-5857-4685-be1f-d57550cc96cc">
-      <Terms xmlns="http://schemas.microsoft.com/office/infopath/2007/PartnerControls"/>
-    </FeatureTagsTaxHTField0>
-    <PublishStatusLookup xmlns="4873beb7-5857-4685-be1f-d57550cc96cc">
-      <Value>1669414</Value>
-      <Value>1669470</Value>
-    </PublishStatusLookup>
-    <Providers xmlns="4873beb7-5857-4685-be1f-d57550cc96cc" xsi:nil="true"/>
-    <MachineTranslated xmlns="4873beb7-5857-4685-be1f-d57550cc96cc">false</MachineTranslated>
-    <OriginalSourceMarket xmlns="4873beb7-5857-4685-be1f-d57550cc96cc" xsi:nil="true"/>
-    <APDescription xmlns="4873beb7-5857-4685-be1f-d57550cc96cc" xsi:nil="true"/>
-    <ClipArtFilename xmlns="4873beb7-5857-4685-be1f-d57550cc96cc" xsi:nil="true"/>
-    <ContentItem xmlns="4873beb7-5857-4685-be1f-d57550cc96cc" xsi:nil="true"/>
-    <TPInstallLocation xmlns="4873beb7-5857-4685-be1f-d57550cc96cc" xsi:nil="true"/>
-    <PublishTargets xmlns="4873beb7-5857-4685-be1f-d57550cc96cc">OfficeOnlineVNext</PublishTargets>
-    <TimesCloned xmlns="4873beb7-5857-4685-be1f-d57550cc96cc" xsi:nil="true"/>
-    <AssetStart xmlns="4873beb7-5857-4685-be1f-d57550cc96cc">2013-01-21T12:05:00+00:00</AssetStart>
-    <Provider xmlns="4873beb7-5857-4685-be1f-d57550cc96cc" xsi:nil="true"/>
-    <AcquiredFrom xmlns="4873beb7-5857-4685-be1f-d57550cc96cc">Internal MS</AcquiredFrom>
-    <FriendlyTitle xmlns="4873beb7-5857-4685-be1f-d57550cc96cc" xsi:nil="true"/>
-    <LastHandOff xmlns="4873beb7-5857-4685-be1f-d57550cc96cc" xsi:nil="true"/>
-    <TPClientViewer xmlns="4873beb7-5857-4685-be1f-d57550cc96cc" xsi:nil="true"/>
-    <UACurrentWords xmlns="4873beb7-5857-4685-be1f-d57550cc96cc" xsi:nil="true"/>
-    <ArtSampleDocs xmlns="4873beb7-5857-4685-be1f-d57550cc96cc" xsi:nil="true"/>
-    <UALocRecommendation xmlns="4873beb7-5857-4685-be1f-d57550cc96cc">Localize</UALocRecommendation>
-    <Manager xmlns="4873beb7-5857-4685-be1f-d57550cc96cc" xsi:nil="true"/>
-    <ShowIn xmlns="4873beb7-5857-4685-be1f-d57550cc96cc">Show everywhere</ShowIn>
-    <UANotes xmlns="4873beb7-5857-4685-be1f-d57550cc96cc" xsi:nil="true"/>
-    <TemplateStatus xmlns="4873beb7-5857-4685-be1f-d57550cc96cc">Complete</TemplateStatus>
-    <InternalTagsTaxHTField0 xmlns="4873beb7-5857-4685-be1f-d57550cc96cc">
-      <Terms xmlns="http://schemas.microsoft.com/office/infopath/2007/PartnerControls"/>
-    </InternalTagsTaxHTField0>
-    <CSXHash xmlns="4873beb7-5857-4685-be1f-d57550cc96cc" xsi:nil="true"/>
-    <Downloads xmlns="4873beb7-5857-4685-be1f-d57550cc96cc">0</Downloads>
-    <VoteCount xmlns="4873beb7-5857-4685-be1f-d57550cc96cc" xsi:nil="true"/>
-    <OOCacheId xmlns="4873beb7-5857-4685-be1f-d57550cc96cc" xsi:nil="true"/>
-    <IsDeleted xmlns="4873beb7-5857-4685-be1f-d57550cc96cc">false</IsDeleted>
-    <AssetExpire xmlns="4873beb7-5857-4685-be1f-d57550cc96cc">2029-01-01T08:00:00+00:00</AssetExpire>
-    <DSATActionTaken xmlns="4873beb7-5857-4685-be1f-d57550cc96cc" xsi:nil="true"/>
-    <CSXSubmissionMarket xmlns="4873beb7-5857-4685-be1f-d57550cc96cc" xsi:nil="true"/>
-    <TPExecutable xmlns="4873beb7-5857-4685-be1f-d57550cc96cc" xsi:nil="true"/>
-    <SubmitterId xmlns="4873beb7-5857-4685-be1f-d57550cc96cc" xsi:nil="true"/>
-    <EditorialTags xmlns="4873beb7-5857-4685-be1f-d57550cc96cc" xsi:nil="true"/>
-    <AssetType xmlns="4873beb7-5857-4685-be1f-d57550cc96cc">TP</AssetType>
-    <BugNumber xmlns="4873beb7-5857-4685-be1f-d57550cc96cc" xsi:nil="true"/>
-    <CSXSubmissionDate xmlns="4873beb7-5857-4685-be1f-d57550cc96cc" xsi:nil="true"/>
-    <CSXUpdate xmlns="4873beb7-5857-4685-be1f-d57550cc96cc">false</CSXUpdate>
-    <ApprovalLog xmlns="4873beb7-5857-4685-be1f-d57550cc96cc" xsi:nil="true"/>
-    <Milestone xmlns="4873beb7-5857-4685-be1f-d57550cc96cc" xsi:nil="true"/>
-    <RecommendationsModifier xmlns="4873beb7-5857-4685-be1f-d57550cc96cc" xsi:nil="true"/>
-    <OriginAsset xmlns="4873beb7-5857-4685-be1f-d57550cc96cc" xsi:nil="true"/>
-    <TPComponent xmlns="4873beb7-5857-4685-be1f-d57550cc96cc" xsi:nil="true"/>
-    <AssetId xmlns="4873beb7-5857-4685-be1f-d57550cc96cc">TP104001550</AssetId>
-    <IntlLocPriority xmlns="4873beb7-5857-4685-be1f-d57550cc96cc" xsi:nil="true"/>
-    <PolicheckWords xmlns="4873beb7-5857-4685-be1f-d57550cc96cc" xsi:nil="true"/>
-    <TPLaunchHelpLink xmlns="4873beb7-5857-4685-be1f-d57550cc96cc" xsi:nil="true"/>
-    <TPApplication xmlns="4873beb7-5857-4685-be1f-d57550cc96cc" xsi:nil="true"/>
-    <CrawlForDependencies xmlns="4873beb7-5857-4685-be1f-d57550cc96cc">false</CrawlForDependencies>
-    <HandoffToMSDN xmlns="4873beb7-5857-4685-be1f-d57550cc96cc" xsi:nil="true"/>
-    <PlannedPubDate xmlns="4873beb7-5857-4685-be1f-d57550cc96cc" xsi:nil="true"/>
-    <IntlLangReviewer xmlns="4873beb7-5857-4685-be1f-d57550cc96cc" xsi:nil="true"/>
-    <TrustLevel xmlns="4873beb7-5857-4685-be1f-d57550cc96cc">1 Microsoft Managed Content</TrustLevel>
-    <LocLastLocAttemptVersionLookup xmlns="4873beb7-5857-4685-be1f-d57550cc96cc">875987</LocLastLocAttemptVersionLookup>
-    <IsSearchable xmlns="4873beb7-5857-4685-be1f-d57550cc96cc">true</IsSearchable>
-    <TemplateTemplateType xmlns="4873beb7-5857-4685-be1f-d57550cc96cc">PowerPoint Presentation Template</TemplateTemplateType>
-    <CampaignTagsTaxHTField0 xmlns="4873beb7-5857-4685-be1f-d57550cc96cc">
-      <Terms xmlns="http://schemas.microsoft.com/office/infopath/2007/PartnerControls"/>
-    </CampaignTagsTaxHTField0>
-    <TPNamespace xmlns="4873beb7-5857-4685-be1f-d57550cc96cc" xsi:nil="true"/>
-    <TaxCatchAll xmlns="4873beb7-5857-4685-be1f-d57550cc96cc"/>
-    <Markets xmlns="4873beb7-5857-4685-be1f-d57550cc96cc"/>
-    <UAProjectedTotalWords xmlns="4873beb7-5857-4685-be1f-d57550cc96cc" xsi:nil="true"/>
-    <LocMarketGroupTiers2 xmlns="4873beb7-5857-4685-be1f-d57550cc96cc" xsi:nil="true"/>
-    <IntlLangReview xmlns="4873beb7-5857-4685-be1f-d57550cc96cc">false</IntlLangReview>
-    <OutputCachingOn xmlns="4873beb7-5857-4685-be1f-d57550cc96cc">false</OutputCachingOn>
-    <AverageRating xmlns="4873beb7-5857-4685-be1f-d57550cc96cc" xsi:nil="true"/>
-    <APAuthor xmlns="4873beb7-5857-4685-be1f-d57550cc96cc">
-      <UserInfo>
-        <DisplayName>REDMOND\kristaa</DisplayName>
-        <AccountId>136</AccountId>
-        <AccountType/>
-      </UserInfo>
-    </APAuthor>
-    <LocManualTestRequired xmlns="4873beb7-5857-4685-be1f-d57550cc96cc">false</LocManualTestRequired>
-    <TPCommandLine xmlns="4873beb7-5857-4685-be1f-d57550cc96cc" xsi:nil="true"/>
-    <TPAppVersion xmlns="4873beb7-5857-4685-be1f-d57550cc96cc" xsi:nil="true"/>
-    <EditorialStatus xmlns="4873beb7-5857-4685-be1f-d57550cc96cc">Complete</EditorialStatus>
-    <LastModifiedDateTime xmlns="4873beb7-5857-4685-be1f-d57550cc96cc" xsi:nil="true"/>
-    <ScenarioTagsTaxHTField0 xmlns="4873beb7-5857-4685-be1f-d57550cc96cc">
-      <Terms xmlns="http://schemas.microsoft.com/office/infopath/2007/PartnerControls"/>
-    </ScenarioTagsTaxHTField0>
-    <OriginalRelease xmlns="4873beb7-5857-4685-be1f-d57550cc96cc">15</OriginalRelease>
-    <TPLaunchHelpLinkType xmlns="4873beb7-5857-4685-be1f-d57550cc96cc">Template</TPLaunchHelpLinkType>
-    <LocalizationTagsTaxHTField0 xmlns="4873beb7-5857-4685-be1f-d57550cc96cc">
-      <Terms xmlns="http://schemas.microsoft.com/office/infopath/2007/PartnerControls"/>
-    </LocalizationTagsTaxHTField0>
-  </documentManagement>
-</p:properties>
-</file>
-
-<file path=customXml/item2.xml><?xml version="1.0" encoding="utf-8"?>
-<?mso-contentType ?>
-<FormTemplates xmlns="http://schemas.microsoft.com/sharepoint/v3/contenttype/forms">
-  <Display>DocumentLibraryForm</Display>
-  <Edit>AssetEditForm</Edit>
-  <New>DocumentLibraryForm</New>
-</FormTemplates>
-</file>
-
-<file path=customXml/item3.xml><?xml version="1.0" encoding="utf-8"?>
 <ct:contentTypeSchema xmlns:ct="http://schemas.microsoft.com/office/2006/metadata/contentType" xmlns:ma="http://schemas.microsoft.com/office/2006/metadata/properties/metaAttributes" ct:_="" ma:_="" ma:contentTypeName="TemplateFile" ma:contentTypeID="0x0101006EDDDB5EE6D98C44930B742096920B300400F5B6D36B3EF94B4E9A635CDF2A18F5B8" ma:contentTypeVersion="72" ma:contentTypeDescription="Create a new document." ma:contentTypeScope="" ma:versionID="a23e56308344d904b51738559c3d67c9">
   <xsd:schema xmlns:xsd="http://www.w3.org/2001/XMLSchema" xmlns:xs="http://www.w3.org/2001/XMLSchema" xmlns:p="http://schemas.microsoft.com/office/2006/metadata/properties" xmlns:ns2="4873beb7-5857-4685-be1f-d57550cc96cc" targetNamespace="http://schemas.microsoft.com/office/2006/metadata/properties" ma:root="true" ma:fieldsID="cd0908cc4600e77bf5da051303e00c8d" ns2:_="">
     <xsd:import namespace="4873beb7-5857-4685-be1f-d57550cc96cc"/>
@@ -24178,25 +24449,143 @@
 </ct:contentTypeSchema>
 </file>
 
-<file path=customXml/itemProps1.xml><?xml version="1.0" encoding="utf-8"?>
-<ds:datastoreItem xmlns:ds="http://schemas.openxmlformats.org/officeDocument/2006/customXml" ds:itemID="{A9F945EE-6400-432A-A9B1-179A0A2A37CE}">
-  <ds:schemaRefs>
-    <ds:schemaRef ds:uri="http://schemas.microsoft.com/office/2006/metadata/properties"/>
-    <ds:schemaRef ds:uri="http://schemas.microsoft.com/office/infopath/2007/PartnerControls"/>
-    <ds:schemaRef ds:uri="4873beb7-5857-4685-be1f-d57550cc96cc"/>
-  </ds:schemaRefs>
-</ds:datastoreItem>
+<file path=customXml/item2.xml><?xml version="1.0" encoding="utf-8"?>
+<?mso-contentType ?>
+<FormTemplates xmlns="http://schemas.microsoft.com/sharepoint/v3/contenttype/forms">
+  <Display>DocumentLibraryForm</Display>
+  <Edit>AssetEditForm</Edit>
+  <New>DocumentLibraryForm</New>
+</FormTemplates>
 </file>
 
-<file path=customXml/itemProps2.xml><?xml version="1.0" encoding="utf-8"?>
-<ds:datastoreItem xmlns:ds="http://schemas.openxmlformats.org/officeDocument/2006/customXml" ds:itemID="{A1110015-E380-4C53-980C-698226C61CAC}">
-  <ds:schemaRefs>
-    <ds:schemaRef ds:uri="http://schemas.microsoft.com/sharepoint/v3/contenttype/forms"/>
-  </ds:schemaRefs>
-</ds:datastoreItem>
+<file path=customXml/item3.xml><?xml version="1.0" encoding="utf-8"?>
+<p:properties xmlns:p="http://schemas.microsoft.com/office/2006/metadata/properties" xmlns:xsi="http://www.w3.org/2001/XMLSchema-instance" xmlns:pc="http://schemas.microsoft.com/office/infopath/2007/PartnerControls">
+  <documentManagement>
+    <DirectSourceMarket xmlns="4873beb7-5857-4685-be1f-d57550cc96cc" xsi:nil="true"/>
+    <ApprovalStatus xmlns="4873beb7-5857-4685-be1f-d57550cc96cc">InProgress</ApprovalStatus>
+    <MarketSpecific xmlns="4873beb7-5857-4685-be1f-d57550cc96cc">false</MarketSpecific>
+    <LocComments xmlns="4873beb7-5857-4685-be1f-d57550cc96cc" xsi:nil="true"/>
+    <ThumbnailAssetId xmlns="4873beb7-5857-4685-be1f-d57550cc96cc" xsi:nil="true"/>
+    <PrimaryImageGen xmlns="4873beb7-5857-4685-be1f-d57550cc96cc">true</PrimaryImageGen>
+    <LegacyData xmlns="4873beb7-5857-4685-be1f-d57550cc96cc" xsi:nil="true"/>
+    <LocRecommendedHandoff xmlns="4873beb7-5857-4685-be1f-d57550cc96cc" xsi:nil="true"/>
+    <BusinessGroup xmlns="4873beb7-5857-4685-be1f-d57550cc96cc" xsi:nil="true"/>
+    <BlockPublish xmlns="4873beb7-5857-4685-be1f-d57550cc96cc">false</BlockPublish>
+    <TPFriendlyName xmlns="4873beb7-5857-4685-be1f-d57550cc96cc" xsi:nil="true"/>
+    <NumericId xmlns="4873beb7-5857-4685-be1f-d57550cc96cc" xsi:nil="true"/>
+    <APEditor xmlns="4873beb7-5857-4685-be1f-d57550cc96cc">
+      <UserInfo>
+        <DisplayName/>
+        <AccountId xsi:nil="true"/>
+        <AccountType/>
+      </UserInfo>
+    </APEditor>
+    <SourceTitle xmlns="4873beb7-5857-4685-be1f-d57550cc96cc" xsi:nil="true"/>
+    <OpenTemplate xmlns="4873beb7-5857-4685-be1f-d57550cc96cc">true</OpenTemplate>
+    <UALocComments xmlns="4873beb7-5857-4685-be1f-d57550cc96cc" xsi:nil="true"/>
+    <ParentAssetId xmlns="4873beb7-5857-4685-be1f-d57550cc96cc" xsi:nil="true"/>
+    <IntlLangReviewDate xmlns="4873beb7-5857-4685-be1f-d57550cc96cc" xsi:nil="true"/>
+    <FeatureTagsTaxHTField0 xmlns="4873beb7-5857-4685-be1f-d57550cc96cc">
+      <Terms xmlns="http://schemas.microsoft.com/office/infopath/2007/PartnerControls"/>
+    </FeatureTagsTaxHTField0>
+    <PublishStatusLookup xmlns="4873beb7-5857-4685-be1f-d57550cc96cc">
+      <Value>1669414</Value>
+      <Value>1669470</Value>
+    </PublishStatusLookup>
+    <Providers xmlns="4873beb7-5857-4685-be1f-d57550cc96cc" xsi:nil="true"/>
+    <MachineTranslated xmlns="4873beb7-5857-4685-be1f-d57550cc96cc">false</MachineTranslated>
+    <OriginalSourceMarket xmlns="4873beb7-5857-4685-be1f-d57550cc96cc" xsi:nil="true"/>
+    <APDescription xmlns="4873beb7-5857-4685-be1f-d57550cc96cc" xsi:nil="true"/>
+    <ClipArtFilename xmlns="4873beb7-5857-4685-be1f-d57550cc96cc" xsi:nil="true"/>
+    <ContentItem xmlns="4873beb7-5857-4685-be1f-d57550cc96cc" xsi:nil="true"/>
+    <TPInstallLocation xmlns="4873beb7-5857-4685-be1f-d57550cc96cc" xsi:nil="true"/>
+    <PublishTargets xmlns="4873beb7-5857-4685-be1f-d57550cc96cc">OfficeOnlineVNext</PublishTargets>
+    <TimesCloned xmlns="4873beb7-5857-4685-be1f-d57550cc96cc" xsi:nil="true"/>
+    <AssetStart xmlns="4873beb7-5857-4685-be1f-d57550cc96cc">2013-01-21T12:05:00+00:00</AssetStart>
+    <Provider xmlns="4873beb7-5857-4685-be1f-d57550cc96cc" xsi:nil="true"/>
+    <AcquiredFrom xmlns="4873beb7-5857-4685-be1f-d57550cc96cc">Internal MS</AcquiredFrom>
+    <FriendlyTitle xmlns="4873beb7-5857-4685-be1f-d57550cc96cc" xsi:nil="true"/>
+    <LastHandOff xmlns="4873beb7-5857-4685-be1f-d57550cc96cc" xsi:nil="true"/>
+    <TPClientViewer xmlns="4873beb7-5857-4685-be1f-d57550cc96cc" xsi:nil="true"/>
+    <UACurrentWords xmlns="4873beb7-5857-4685-be1f-d57550cc96cc" xsi:nil="true"/>
+    <ArtSampleDocs xmlns="4873beb7-5857-4685-be1f-d57550cc96cc" xsi:nil="true"/>
+    <UALocRecommendation xmlns="4873beb7-5857-4685-be1f-d57550cc96cc">Localize</UALocRecommendation>
+    <Manager xmlns="4873beb7-5857-4685-be1f-d57550cc96cc" xsi:nil="true"/>
+    <ShowIn xmlns="4873beb7-5857-4685-be1f-d57550cc96cc">Show everywhere</ShowIn>
+    <UANotes xmlns="4873beb7-5857-4685-be1f-d57550cc96cc" xsi:nil="true"/>
+    <TemplateStatus xmlns="4873beb7-5857-4685-be1f-d57550cc96cc">Complete</TemplateStatus>
+    <InternalTagsTaxHTField0 xmlns="4873beb7-5857-4685-be1f-d57550cc96cc">
+      <Terms xmlns="http://schemas.microsoft.com/office/infopath/2007/PartnerControls"/>
+    </InternalTagsTaxHTField0>
+    <CSXHash xmlns="4873beb7-5857-4685-be1f-d57550cc96cc" xsi:nil="true"/>
+    <Downloads xmlns="4873beb7-5857-4685-be1f-d57550cc96cc">0</Downloads>
+    <VoteCount xmlns="4873beb7-5857-4685-be1f-d57550cc96cc" xsi:nil="true"/>
+    <OOCacheId xmlns="4873beb7-5857-4685-be1f-d57550cc96cc" xsi:nil="true"/>
+    <IsDeleted xmlns="4873beb7-5857-4685-be1f-d57550cc96cc">false</IsDeleted>
+    <AssetExpire xmlns="4873beb7-5857-4685-be1f-d57550cc96cc">2029-01-01T08:00:00+00:00</AssetExpire>
+    <DSATActionTaken xmlns="4873beb7-5857-4685-be1f-d57550cc96cc" xsi:nil="true"/>
+    <CSXSubmissionMarket xmlns="4873beb7-5857-4685-be1f-d57550cc96cc" xsi:nil="true"/>
+    <TPExecutable xmlns="4873beb7-5857-4685-be1f-d57550cc96cc" xsi:nil="true"/>
+    <SubmitterId xmlns="4873beb7-5857-4685-be1f-d57550cc96cc" xsi:nil="true"/>
+    <EditorialTags xmlns="4873beb7-5857-4685-be1f-d57550cc96cc" xsi:nil="true"/>
+    <AssetType xmlns="4873beb7-5857-4685-be1f-d57550cc96cc">TP</AssetType>
+    <BugNumber xmlns="4873beb7-5857-4685-be1f-d57550cc96cc" xsi:nil="true"/>
+    <CSXSubmissionDate xmlns="4873beb7-5857-4685-be1f-d57550cc96cc" xsi:nil="true"/>
+    <CSXUpdate xmlns="4873beb7-5857-4685-be1f-d57550cc96cc">false</CSXUpdate>
+    <ApprovalLog xmlns="4873beb7-5857-4685-be1f-d57550cc96cc" xsi:nil="true"/>
+    <Milestone xmlns="4873beb7-5857-4685-be1f-d57550cc96cc" xsi:nil="true"/>
+    <RecommendationsModifier xmlns="4873beb7-5857-4685-be1f-d57550cc96cc" xsi:nil="true"/>
+    <OriginAsset xmlns="4873beb7-5857-4685-be1f-d57550cc96cc" xsi:nil="true"/>
+    <TPComponent xmlns="4873beb7-5857-4685-be1f-d57550cc96cc" xsi:nil="true"/>
+    <AssetId xmlns="4873beb7-5857-4685-be1f-d57550cc96cc">TP104001550</AssetId>
+    <IntlLocPriority xmlns="4873beb7-5857-4685-be1f-d57550cc96cc" xsi:nil="true"/>
+    <PolicheckWords xmlns="4873beb7-5857-4685-be1f-d57550cc96cc" xsi:nil="true"/>
+    <TPLaunchHelpLink xmlns="4873beb7-5857-4685-be1f-d57550cc96cc" xsi:nil="true"/>
+    <TPApplication xmlns="4873beb7-5857-4685-be1f-d57550cc96cc" xsi:nil="true"/>
+    <CrawlForDependencies xmlns="4873beb7-5857-4685-be1f-d57550cc96cc">false</CrawlForDependencies>
+    <HandoffToMSDN xmlns="4873beb7-5857-4685-be1f-d57550cc96cc" xsi:nil="true"/>
+    <PlannedPubDate xmlns="4873beb7-5857-4685-be1f-d57550cc96cc" xsi:nil="true"/>
+    <IntlLangReviewer xmlns="4873beb7-5857-4685-be1f-d57550cc96cc" xsi:nil="true"/>
+    <TrustLevel xmlns="4873beb7-5857-4685-be1f-d57550cc96cc">1 Microsoft Managed Content</TrustLevel>
+    <LocLastLocAttemptVersionLookup xmlns="4873beb7-5857-4685-be1f-d57550cc96cc">875987</LocLastLocAttemptVersionLookup>
+    <IsSearchable xmlns="4873beb7-5857-4685-be1f-d57550cc96cc">true</IsSearchable>
+    <TemplateTemplateType xmlns="4873beb7-5857-4685-be1f-d57550cc96cc">PowerPoint Presentation Template</TemplateTemplateType>
+    <CampaignTagsTaxHTField0 xmlns="4873beb7-5857-4685-be1f-d57550cc96cc">
+      <Terms xmlns="http://schemas.microsoft.com/office/infopath/2007/PartnerControls"/>
+    </CampaignTagsTaxHTField0>
+    <TPNamespace xmlns="4873beb7-5857-4685-be1f-d57550cc96cc" xsi:nil="true"/>
+    <TaxCatchAll xmlns="4873beb7-5857-4685-be1f-d57550cc96cc"/>
+    <Markets xmlns="4873beb7-5857-4685-be1f-d57550cc96cc"/>
+    <UAProjectedTotalWords xmlns="4873beb7-5857-4685-be1f-d57550cc96cc" xsi:nil="true"/>
+    <LocMarketGroupTiers2 xmlns="4873beb7-5857-4685-be1f-d57550cc96cc" xsi:nil="true"/>
+    <IntlLangReview xmlns="4873beb7-5857-4685-be1f-d57550cc96cc">false</IntlLangReview>
+    <OutputCachingOn xmlns="4873beb7-5857-4685-be1f-d57550cc96cc">false</OutputCachingOn>
+    <AverageRating xmlns="4873beb7-5857-4685-be1f-d57550cc96cc" xsi:nil="true"/>
+    <APAuthor xmlns="4873beb7-5857-4685-be1f-d57550cc96cc">
+      <UserInfo>
+        <DisplayName>REDMOND\kristaa</DisplayName>
+        <AccountId>136</AccountId>
+        <AccountType/>
+      </UserInfo>
+    </APAuthor>
+    <LocManualTestRequired xmlns="4873beb7-5857-4685-be1f-d57550cc96cc">false</LocManualTestRequired>
+    <TPCommandLine xmlns="4873beb7-5857-4685-be1f-d57550cc96cc" xsi:nil="true"/>
+    <TPAppVersion xmlns="4873beb7-5857-4685-be1f-d57550cc96cc" xsi:nil="true"/>
+    <EditorialStatus xmlns="4873beb7-5857-4685-be1f-d57550cc96cc">Complete</EditorialStatus>
+    <LastModifiedDateTime xmlns="4873beb7-5857-4685-be1f-d57550cc96cc" xsi:nil="true"/>
+    <ScenarioTagsTaxHTField0 xmlns="4873beb7-5857-4685-be1f-d57550cc96cc">
+      <Terms xmlns="http://schemas.microsoft.com/office/infopath/2007/PartnerControls"/>
+    </ScenarioTagsTaxHTField0>
+    <OriginalRelease xmlns="4873beb7-5857-4685-be1f-d57550cc96cc">15</OriginalRelease>
+    <TPLaunchHelpLinkType xmlns="4873beb7-5857-4685-be1f-d57550cc96cc">Template</TPLaunchHelpLinkType>
+    <LocalizationTagsTaxHTField0 xmlns="4873beb7-5857-4685-be1f-d57550cc96cc">
+      <Terms xmlns="http://schemas.microsoft.com/office/infopath/2007/PartnerControls"/>
+    </LocalizationTagsTaxHTField0>
+  </documentManagement>
+</p:properties>
 </file>
 
-<file path=customXml/itemProps3.xml><?xml version="1.0" encoding="utf-8"?>
+<file path=customXml/itemProps1.xml><?xml version="1.0" encoding="utf-8"?>
 <ds:datastoreItem xmlns:ds="http://schemas.openxmlformats.org/officeDocument/2006/customXml" ds:itemID="{AF7E4019-AE58-4CAA-B67D-559F9FEEB202}">
   <ds:schemaRefs>
     <ds:schemaRef ds:uri="http://schemas.microsoft.com/office/2006/metadata/contentType"/>
@@ -24212,4 +24601,22 @@
     <ds:schemaRef ds:uri="http://schemas.microsoft.com/internal/obd"/>
   </ds:schemaRefs>
 </ds:datastoreItem>
+</file>
+
+<file path=customXml/itemProps2.xml><?xml version="1.0" encoding="utf-8"?>
+<ds:datastoreItem xmlns:ds="http://schemas.openxmlformats.org/officeDocument/2006/customXml" ds:itemID="{A1110015-E380-4C53-980C-698226C61CAC}">
+  <ds:schemaRefs>
+    <ds:schemaRef ds:uri="http://schemas.microsoft.com/sharepoint/v3/contenttype/forms"/>
+  </ds:schemaRefs>
+</ds:datastoreItem>
+</file>
+
+<file path=customXml/itemProps3.xml><?xml version="1.0" encoding="utf-8"?>
+<ds:datastoreItem xmlns:ds="http://schemas.openxmlformats.org/officeDocument/2006/customXml" ds:itemID="{A9F945EE-6400-432A-A9B1-179A0A2A37CE}">
+  <ds:schemaRefs>
+    <ds:schemaRef ds:uri="http://schemas.microsoft.com/office/2006/metadata/properties"/>
+    <ds:schemaRef ds:uri="http://schemas.microsoft.com/office/infopath/2007/PartnerControls"/>
+    <ds:schemaRef ds:uri="4873beb7-5857-4685-be1f-d57550cc96cc"/>
+  </ds:schemaRefs>
+</ds:datastoreItem>
 </file>
</xml_diff>

<commit_message>
Final tweaks to poster
</commit_message>
<xml_diff>
--- a/Poster/NSDI Poster.pptx
+++ b/Poster/NSDI Poster.pptx
@@ -203,7 +203,7 @@
           <a:p>
             <a:fld id="{F1C0B079-A316-4C9B-B165-DF9EA8325D2C}" type="datetimeFigureOut">
               <a:rPr lang="en-US" smtClean="0"/>
-              <a:t>4/4/18</a:t>
+              <a:t>4/5/18</a:t>
             </a:fld>
             <a:endParaRPr lang="en-US"/>
           </a:p>
@@ -368,7 +368,7 @@
           <a:p>
             <a:fld id="{38F28AB8-57D1-494F-9851-055AD867E790}" type="datetimeFigureOut">
               <a:rPr lang="en-US" smtClean="0"/>
-              <a:t>4/4/18</a:t>
+              <a:t>4/5/18</a:t>
             </a:fld>
             <a:endParaRPr lang="en-US"/>
           </a:p>
@@ -1876,7 +1876,7 @@
             <a:fld id="{ECAA57DF-1C19-4726-AB84-014692BAD8F5}" type="datetimeFigureOut">
               <a:rPr lang="en-US" smtClean="0"/>
               <a:pPr/>
-              <a:t>4/4/18</a:t>
+              <a:t>4/5/18</a:t>
             </a:fld>
             <a:endParaRPr lang="en-US"/>
           </a:p>
@@ -3284,7 +3284,7 @@
             <a:fld id="{ECAA57DF-1C19-4726-AB84-014692BAD8F5}" type="datetimeFigureOut">
               <a:rPr lang="en-US" smtClean="0"/>
               <a:pPr/>
-              <a:t>4/4/18</a:t>
+              <a:t>4/5/18</a:t>
             </a:fld>
             <a:endParaRPr lang="en-US"/>
           </a:p>
@@ -4686,7 +4686,7 @@
             <a:fld id="{ECAA57DF-1C19-4726-AB84-014692BAD8F5}" type="datetimeFigureOut">
               <a:rPr lang="en-US" smtClean="0"/>
               <a:pPr/>
-              <a:t>4/4/18</a:t>
+              <a:t>4/5/18</a:t>
             </a:fld>
             <a:endParaRPr lang="en-US"/>
           </a:p>
@@ -4949,7 +4949,7 @@
           <a:p>
             <a:fld id="{ECAA57DF-1C19-4726-AB84-014692BAD8F5}" type="datetimeFigureOut">
               <a:rPr lang="en-US" smtClean="0"/>
-              <a:t>4/4/18</a:t>
+              <a:t>4/5/18</a:t>
             </a:fld>
             <a:endParaRPr lang="en-US"/>
           </a:p>
@@ -8736,7 +8736,7 @@
             <a:fld id="{ECAA57DF-1C19-4726-AB84-014692BAD8F5}" type="datetimeFigureOut">
               <a:rPr lang="en-US" smtClean="0"/>
               <a:pPr/>
-              <a:t>4/4/18</a:t>
+              <a:t>4/5/18</a:t>
             </a:fld>
             <a:endParaRPr lang="en-US"/>
           </a:p>
@@ -10072,7 +10072,7 @@
             <a:fld id="{ECAA57DF-1C19-4726-AB84-014692BAD8F5}" type="datetimeFigureOut">
               <a:rPr lang="en-US" smtClean="0"/>
               <a:pPr/>
-              <a:t>4/4/18</a:t>
+              <a:t>4/5/18</a:t>
             </a:fld>
             <a:endParaRPr lang="en-US"/>
           </a:p>
@@ -11542,7 +11542,7 @@
             <a:fld id="{ECAA57DF-1C19-4726-AB84-014692BAD8F5}" type="datetimeFigureOut">
               <a:rPr lang="en-US" smtClean="0"/>
               <a:pPr/>
-              <a:t>4/4/18</a:t>
+              <a:t>4/5/18</a:t>
             </a:fld>
             <a:endParaRPr lang="en-US"/>
           </a:p>
@@ -13156,7 +13156,7 @@
             <a:fld id="{ECAA57DF-1C19-4726-AB84-014692BAD8F5}" type="datetimeFigureOut">
               <a:rPr lang="en-US" smtClean="0"/>
               <a:pPr/>
-              <a:t>4/4/18</a:t>
+              <a:t>4/5/18</a:t>
             </a:fld>
             <a:endParaRPr lang="en-US"/>
           </a:p>
@@ -14503,7 +14503,7 @@
             <a:fld id="{ECAA57DF-1C19-4726-AB84-014692BAD8F5}" type="datetimeFigureOut">
               <a:rPr lang="en-US" smtClean="0"/>
               <a:pPr/>
-              <a:t>4/4/18</a:t>
+              <a:t>4/5/18</a:t>
             </a:fld>
             <a:endParaRPr lang="en-US"/>
           </a:p>
@@ -14610,7 +14610,7 @@
             <a:fld id="{ECAA57DF-1C19-4726-AB84-014692BAD8F5}" type="datetimeFigureOut">
               <a:rPr lang="en-US" smtClean="0"/>
               <a:pPr/>
-              <a:t>4/4/18</a:t>
+              <a:t>4/5/18</a:t>
             </a:fld>
             <a:endParaRPr lang="en-US"/>
           </a:p>
@@ -16087,7 +16087,7 @@
             <a:fld id="{ECAA57DF-1C19-4726-AB84-014692BAD8F5}" type="datetimeFigureOut">
               <a:rPr lang="en-US" smtClean="0"/>
               <a:pPr/>
-              <a:t>4/4/18</a:t>
+              <a:t>4/5/18</a:t>
             </a:fld>
             <a:endParaRPr lang="en-US"/>
           </a:p>
@@ -17451,7 +17451,7 @@
             <a:fld id="{ECAA57DF-1C19-4726-AB84-014692BAD8F5}" type="datetimeFigureOut">
               <a:rPr lang="en-US" smtClean="0"/>
               <a:pPr/>
-              <a:t>4/4/18</a:t>
+              <a:t>4/5/18</a:t>
             </a:fld>
             <a:endParaRPr lang="en-US"/>
           </a:p>
@@ -17703,7 +17703,7 @@
             <a:fld id="{ECAA57DF-1C19-4726-AB84-014692BAD8F5}" type="datetimeFigureOut">
               <a:rPr lang="en-US" smtClean="0"/>
               <a:pPr/>
-              <a:t>4/4/18</a:t>
+              <a:t>4/5/18</a:t>
             </a:fld>
             <a:endParaRPr lang="en-US"/>
           </a:p>
@@ -18215,17 +18215,19 @@
       </p:grpSpPr>
       <p:pic>
         <p:nvPicPr>
-          <p:cNvPr id="40" name="Picture 39">
+          <p:cNvPr id="13" name="Content Placeholder 12">
             <a:extLst>
               <a:ext uri="{FF2B5EF4-FFF2-40B4-BE49-F238E27FC236}">
-                <a16:creationId xmlns:a16="http://schemas.microsoft.com/office/drawing/2014/main" xmlns="" id="{9B1335D0-5878-784C-81A4-5AE957B163F9}"/>
+                <a16:creationId xmlns:a16="http://schemas.microsoft.com/office/drawing/2014/main" xmlns="" id="{3222FE94-EA77-4942-9DB9-17C7E60A56BD}"/>
               </a:ext>
             </a:extLst>
           </p:cNvPr>
           <p:cNvPicPr>
-            <a:picLocks noChangeAspect="1"/>
+            <a:picLocks noGrp="1" noChangeAspect="1"/>
           </p:cNvPicPr>
-          <p:nvPr/>
+          <p:nvPr>
+            <p:ph sz="quarter" idx="30"/>
+          </p:nvPr>
         </p:nvPicPr>
         <p:blipFill>
           <a:blip r:embed="rId2">
@@ -18241,12 +18243,9 @@
         </p:blipFill>
         <p:spPr>
           <a:xfrm>
-            <a:off x="36127509" y="14740663"/>
-            <a:ext cx="7323830" cy="8382185"/>
+            <a:off x="29690916" y="6968604"/>
+            <a:ext cx="6890563" cy="5896837"/>
           </a:xfrm>
-          <a:prstGeom prst="rect">
-            <a:avLst/>
-          </a:prstGeom>
         </p:spPr>
       </p:pic>
       <p:pic>
@@ -18277,16 +18276,193 @@
         </p:blipFill>
         <p:spPr>
           <a:xfrm>
-            <a:off x="22444256" y="12830693"/>
-            <a:ext cx="6848233" cy="6758797"/>
+            <a:off x="21646880" y="12432837"/>
+            <a:ext cx="7827349" cy="7507863"/>
           </a:xfrm>
           <a:prstGeom prst="rect">
             <a:avLst/>
           </a:prstGeom>
         </p:spPr>
       </p:pic>
-      <mc:AlternateContent xmlns:mc="http://schemas.openxmlformats.org/markup-compatibility/2006">
-        <mc:Choice xmlns:a14="http://schemas.microsoft.com/office/drawing/2010/main" Requires="a14">
+      <p:sp>
+        <p:nvSpPr>
+          <p:cNvPr id="4" name="Title 3"/>
+          <p:cNvSpPr>
+            <a:spLocks noGrp="1"/>
+          </p:cNvSpPr>
+          <p:nvPr>
+            <p:ph type="title"/>
+          </p:nvPr>
+        </p:nvSpPr>
+        <p:spPr>
+          <a:xfrm>
+            <a:off x="6400800" y="328630"/>
+            <a:ext cx="31089600" cy="2514540"/>
+          </a:xfrm>
+        </p:spPr>
+        <p:txBody>
+          <a:bodyPr>
+            <a:noAutofit/>
+          </a:bodyPr>
+          <a:lstStyle/>
+          <a:p>
+            <a:r>
+              <a:rPr lang="en-US" sz="9600" dirty="0"/>
+              <a:t>Auto-completion for Network Configurations</a:t>
+            </a:r>
+          </a:p>
+        </p:txBody>
+      </p:sp>
+      <p:sp>
+        <p:nvSpPr>
+          <p:cNvPr id="5" name="Text Placeholder 4"/>
+          <p:cNvSpPr>
+            <a:spLocks noGrp="1"/>
+          </p:cNvSpPr>
+          <p:nvPr>
+            <p:ph type="body" sz="quarter" idx="13"/>
+          </p:nvPr>
+        </p:nvSpPr>
+        <p:spPr/>
+        <p:txBody>
+          <a:bodyPr/>
+          <a:lstStyle/>
+          <a:p>
+            <a:r>
+              <a:rPr lang="en-US" dirty="0"/>
+              <a:t>Introduction</a:t>
+            </a:r>
+          </a:p>
+        </p:txBody>
+      </p:sp>
+      <p:sp>
+        <p:nvSpPr>
+          <p:cNvPr id="11" name="Content Placeholder 10"/>
+          <p:cNvSpPr>
+            <a:spLocks noGrp="1"/>
+          </p:cNvSpPr>
+          <p:nvPr>
+            <p:ph sz="quarter" idx="24"/>
+          </p:nvPr>
+        </p:nvSpPr>
+        <p:spPr>
+          <a:xfrm>
+            <a:off x="1261309" y="12273074"/>
+            <a:ext cx="12107781" cy="2674369"/>
+          </a:xfrm>
+        </p:spPr>
+        <p:txBody>
+          <a:bodyPr>
+            <a:noAutofit/>
+          </a:bodyPr>
+          <a:lstStyle/>
+          <a:p>
+            <a:r>
+              <a:rPr lang="en-US" sz="2800" dirty="0"/>
+              <a:t>State of the art tools offer simple tab-completion and preset templates</a:t>
+            </a:r>
+          </a:p>
+          <a:p>
+            <a:r>
+              <a:rPr lang="en-US" sz="2800" dirty="0"/>
+              <a:t>We predict a code completion engine would offer better resilience to human errors</a:t>
+            </a:r>
+          </a:p>
+          <a:p>
+            <a:endParaRPr lang="en-US" sz="2800" dirty="0"/>
+          </a:p>
+          <a:p>
+            <a:endParaRPr lang="en-US" sz="2800" dirty="0"/>
+          </a:p>
+        </p:txBody>
+      </p:sp>
+      <p:sp>
+        <p:nvSpPr>
+          <p:cNvPr id="7" name="Text Placeholder 6"/>
+          <p:cNvSpPr>
+            <a:spLocks noGrp="1"/>
+          </p:cNvSpPr>
+          <p:nvPr>
+            <p:ph type="body" sz="quarter" idx="17"/>
+          </p:nvPr>
+        </p:nvSpPr>
+        <p:spPr>
+          <a:xfrm>
+            <a:off x="1435894" y="15464320"/>
+            <a:ext cx="12801600" cy="1219200"/>
+          </a:xfrm>
+        </p:spPr>
+        <p:txBody>
+          <a:bodyPr/>
+          <a:lstStyle/>
+          <a:p>
+            <a:r>
+              <a:rPr lang="en-US" dirty="0"/>
+              <a:t>Feasibility analysis</a:t>
+            </a:r>
+          </a:p>
+        </p:txBody>
+      </p:sp>
+      <p:sp>
+        <p:nvSpPr>
+          <p:cNvPr id="56" name="Content Placeholder 55">
+            <a:extLst>
+              <a:ext uri="{FF2B5EF4-FFF2-40B4-BE49-F238E27FC236}">
+                <a16:creationId xmlns:a16="http://schemas.microsoft.com/office/drawing/2014/main" xmlns="" id="{D2B8C290-3994-9B4E-A1E5-40D781DA7147}"/>
+              </a:ext>
+            </a:extLst>
+          </p:cNvPr>
+          <p:cNvSpPr>
+            <a:spLocks noGrp="1"/>
+          </p:cNvSpPr>
+          <p:nvPr>
+            <p:ph sz="quarter" idx="25"/>
+          </p:nvPr>
+        </p:nvSpPr>
+        <p:spPr>
+          <a:xfrm>
+            <a:off x="1143000" y="17314801"/>
+            <a:ext cx="12801600" cy="4936178"/>
+          </a:xfrm>
+        </p:spPr>
+        <p:txBody>
+          <a:bodyPr>
+            <a:normAutofit/>
+          </a:bodyPr>
+          <a:lstStyle/>
+          <a:p>
+            <a:r>
+              <a:rPr lang="en-US" sz="2800" dirty="0"/>
+              <a:t>Previous measurement studies have revealed extensive use of templates in network configurations </a:t>
+            </a:r>
+            <a:r>
+              <a:rPr lang="en-US" sz="2800" dirty="0" smtClean="0"/>
+              <a:t>[1]</a:t>
+            </a:r>
+            <a:endParaRPr lang="en-US" sz="2800" dirty="0"/>
+          </a:p>
+          <a:p>
+            <a:r>
+              <a:rPr lang="en-US" sz="2800" dirty="0"/>
+              <a:t>Our observations indicate that most of a device’s configuration could be constructed from existing configurations</a:t>
+            </a:r>
+          </a:p>
+          <a:p>
+            <a:r>
+              <a:rPr lang="en-US" sz="2800" dirty="0"/>
+              <a:t>Our prediction engine thus constructs a model from histories of configurations</a:t>
+            </a:r>
+          </a:p>
+          <a:p>
+            <a:pPr marL="0" indent="0">
+              <a:buNone/>
+            </a:pPr>
+            <a:endParaRPr lang="en-US" sz="2800" dirty="0"/>
+          </a:p>
+        </p:txBody>
+      </p:sp>
+      <mc:AlternateContent xmlns:mc="http://schemas.openxmlformats.org/markup-compatibility/2006" xmlns:a14="http://schemas.microsoft.com/office/drawing/2010/main">
+        <mc:Choice Requires="a14">
           <p:sp>
             <p:nvSpPr>
               <p:cNvPr id="57" name="Content Placeholder 56">
@@ -18305,8 +18481,8 @@
             </p:nvSpPr>
             <p:spPr>
               <a:xfrm>
-                <a:off x="15931164" y="7504064"/>
-                <a:ext cx="12801600" cy="4287555"/>
+                <a:off x="15987637" y="6874864"/>
+                <a:ext cx="12801600" cy="4581126"/>
               </a:xfrm>
             </p:spPr>
             <p:txBody>
@@ -18708,13 +18884,13 @@
             </p:txBody>
           </p:sp>
         </mc:Choice>
-        <mc:Fallback>
+        <mc:Fallback xmlns="">
           <p:sp>
             <p:nvSpPr>
               <p:cNvPr id="57" name="Content Placeholder 56">
                 <a:extLst>
                   <a:ext uri="{FF2B5EF4-FFF2-40B4-BE49-F238E27FC236}">
-                    <a16:creationId xmlns:a16="http://schemas.microsoft.com/office/drawing/2014/main" xmlns:a14="http://schemas.microsoft.com/office/drawing/2010/main" xmlns="" id="{E7959293-CA99-FE45-92D9-50699C172924}"/>
+                    <a16:creationId xmlns:a16="http://schemas.microsoft.com/office/drawing/2014/main" id="{E7959293-CA99-FE45-92D9-50699C172924}"/>
                   </a:ext>
                 </a:extLst>
               </p:cNvPr>
@@ -18727,13 +18903,13 @@
             </p:nvSpPr>
             <p:spPr>
               <a:xfrm>
-                <a:off x="15931164" y="7504064"/>
-                <a:ext cx="12801600" cy="4287555"/>
+                <a:off x="15987637" y="6874864"/>
+                <a:ext cx="12801600" cy="4581126"/>
               </a:xfrm>
-              <a:blipFill rotWithShape="0">
+              <a:blipFill>
                 <a:blip r:embed="rId4"/>
                 <a:stretch>
-                  <a:fillRect l="-1000"/>
+                  <a:fillRect l="-991" r="-991"/>
                 </a:stretch>
               </a:blipFill>
             </p:spPr>
@@ -18754,6 +18930,462 @@
       </mc:AlternateContent>
       <p:sp>
         <p:nvSpPr>
+          <p:cNvPr id="18" name="Text Placeholder 17"/>
+          <p:cNvSpPr>
+            <a:spLocks noGrp="1"/>
+          </p:cNvSpPr>
+          <p:nvPr>
+            <p:ph type="body" sz="quarter" idx="29"/>
+          </p:nvPr>
+        </p:nvSpPr>
+        <p:spPr>
+          <a:xfrm>
+            <a:off x="15987638" y="11605532"/>
+            <a:ext cx="12801600" cy="1219200"/>
+          </a:xfrm>
+        </p:spPr>
+        <p:txBody>
+          <a:bodyPr/>
+          <a:lstStyle/>
+          <a:p>
+            <a:r>
+              <a:rPr lang="en-US" dirty="0"/>
+              <a:t>placeholders</a:t>
+            </a:r>
+          </a:p>
+        </p:txBody>
+      </p:sp>
+      <p:pic>
+        <p:nvPicPr>
+          <p:cNvPr id="40" name="Picture 39">
+            <a:extLst>
+              <a:ext uri="{FF2B5EF4-FFF2-40B4-BE49-F238E27FC236}">
+                <a16:creationId xmlns:a16="http://schemas.microsoft.com/office/drawing/2014/main" xmlns="" id="{9B1335D0-5878-784C-81A4-5AE957B163F9}"/>
+              </a:ext>
+            </a:extLst>
+          </p:cNvPr>
+          <p:cNvPicPr>
+            <a:picLocks noChangeAspect="1"/>
+          </p:cNvPicPr>
+          <p:nvPr/>
+        </p:nvPicPr>
+        <p:blipFill>
+          <a:blip r:embed="rId5">
+            <a:extLst>
+              <a:ext uri="{28A0092B-C50C-407E-A947-70E740481C1C}">
+                <a14:useLocalDpi xmlns:a14="http://schemas.microsoft.com/office/drawing/2010/main" val="0"/>
+              </a:ext>
+            </a:extLst>
+          </a:blip>
+          <a:stretch>
+            <a:fillRect/>
+          </a:stretch>
+        </p:blipFill>
+        <p:spPr>
+          <a:xfrm>
+            <a:off x="35864800" y="14711369"/>
+            <a:ext cx="7255721" cy="8304232"/>
+          </a:xfrm>
+          <a:prstGeom prst="rect">
+            <a:avLst/>
+          </a:prstGeom>
+        </p:spPr>
+      </p:pic>
+      <p:sp>
+        <p:nvSpPr>
+          <p:cNvPr id="43" name="TextBox 42">
+            <a:extLst>
+              <a:ext uri="{FF2B5EF4-FFF2-40B4-BE49-F238E27FC236}">
+                <a16:creationId xmlns:a16="http://schemas.microsoft.com/office/drawing/2014/main" xmlns="" id="{5DAC9B42-A965-2E4B-9E51-395D6D01FD7B}"/>
+              </a:ext>
+            </a:extLst>
+          </p:cNvPr>
+          <p:cNvSpPr txBox="1"/>
+          <p:nvPr/>
+        </p:nvSpPr>
+        <p:spPr>
+          <a:xfrm>
+            <a:off x="30470061" y="13359601"/>
+            <a:ext cx="5831619" cy="3970318"/>
+          </a:xfrm>
+          <a:prstGeom prst="rect">
+            <a:avLst/>
+          </a:prstGeom>
+          <a:noFill/>
+        </p:spPr>
+        <p:txBody>
+          <a:bodyPr wrap="square" rtlCol="0">
+            <a:spAutoFit/>
+          </a:bodyPr>
+          <a:lstStyle/>
+          <a:p>
+            <a:r>
+              <a:rPr lang="en-US" sz="2800" b="1" dirty="0"/>
+              <a:t>Figure 3</a:t>
+            </a:r>
+            <a:r>
+              <a:rPr lang="en-US" sz="2800" dirty="0"/>
+              <a:t>: The prediction accuracy for the routers in each network. Our approach achieves a high prediction accuracy (&gt;85%) for the majority of routers. Without our placeholders optimization, this accuracy is 5% lower. </a:t>
+            </a:r>
+          </a:p>
+          <a:p>
+            <a:endParaRPr lang="en-US" sz="2800" b="1" dirty="0"/>
+          </a:p>
+        </p:txBody>
+      </p:sp>
+      <p:sp>
+        <p:nvSpPr>
+          <p:cNvPr id="44" name="TextBox 43">
+            <a:extLst>
+              <a:ext uri="{FF2B5EF4-FFF2-40B4-BE49-F238E27FC236}">
+                <a16:creationId xmlns:a16="http://schemas.microsoft.com/office/drawing/2014/main" xmlns="" id="{1BC94FAF-F442-FA46-AD71-53749FA6AB04}"/>
+              </a:ext>
+            </a:extLst>
+          </p:cNvPr>
+          <p:cNvSpPr txBox="1"/>
+          <p:nvPr/>
+        </p:nvSpPr>
+        <p:spPr>
+          <a:xfrm>
+            <a:off x="30412631" y="17713165"/>
+            <a:ext cx="4813704" cy="4339650"/>
+          </a:xfrm>
+          <a:prstGeom prst="rect">
+            <a:avLst/>
+          </a:prstGeom>
+          <a:noFill/>
+        </p:spPr>
+        <p:txBody>
+          <a:bodyPr wrap="square" rtlCol="0">
+            <a:spAutoFit/>
+          </a:bodyPr>
+          <a:lstStyle/>
+          <a:p>
+            <a:r>
+              <a:rPr lang="en-US" sz="2800" b="1" dirty="0"/>
+              <a:t>Figure 5 (Right)</a:t>
+            </a:r>
+            <a:r>
+              <a:rPr lang="en-US" sz="2800" dirty="0"/>
+              <a:t>:  Training on more devices results in higher accuracies. However, training on more devices has diminishing re- turns, because additional devices play the same role as existing devices, and hence are very similar.</a:t>
+            </a:r>
+          </a:p>
+          <a:p>
+            <a:endParaRPr lang="en-US" sz="2400" b="1" dirty="0"/>
+          </a:p>
+        </p:txBody>
+      </p:sp>
+      <p:sp>
+        <p:nvSpPr>
+          <p:cNvPr id="47" name="TextBox 46">
+            <a:extLst>
+              <a:ext uri="{FF2B5EF4-FFF2-40B4-BE49-F238E27FC236}">
+                <a16:creationId xmlns:a16="http://schemas.microsoft.com/office/drawing/2014/main" xmlns="" id="{D10EC450-98A6-A14B-A4F9-F634878E3EFE}"/>
+              </a:ext>
+            </a:extLst>
+          </p:cNvPr>
+          <p:cNvSpPr txBox="1"/>
+          <p:nvPr/>
+        </p:nvSpPr>
+        <p:spPr>
+          <a:xfrm>
+            <a:off x="36986671" y="13353584"/>
+            <a:ext cx="5636295" cy="1815882"/>
+          </a:xfrm>
+          <a:prstGeom prst="rect">
+            <a:avLst/>
+          </a:prstGeom>
+          <a:noFill/>
+        </p:spPr>
+        <p:txBody>
+          <a:bodyPr wrap="square" rtlCol="0">
+            <a:spAutoFit/>
+          </a:bodyPr>
+          <a:lstStyle/>
+          <a:p>
+            <a:r>
+              <a:rPr lang="en-US" sz="2800" b="1" dirty="0"/>
+              <a:t>Figure 4</a:t>
+            </a:r>
+            <a:r>
+              <a:rPr lang="en-US" sz="2800" dirty="0"/>
+              <a:t>: Our framework does not require a long history of configurations to achieve reasonable accuracy. </a:t>
+            </a:r>
+          </a:p>
+        </p:txBody>
+      </p:sp>
+      <p:sp>
+        <p:nvSpPr>
+          <p:cNvPr id="58" name="Content Placeholder 14">
+            <a:extLst>
+              <a:ext uri="{FF2B5EF4-FFF2-40B4-BE49-F238E27FC236}">
+                <a16:creationId xmlns:a16="http://schemas.microsoft.com/office/drawing/2014/main" xmlns="" id="{53153977-76FF-3649-9E56-5A02CD01D677}"/>
+              </a:ext>
+            </a:extLst>
+          </p:cNvPr>
+          <p:cNvSpPr txBox="1">
+            <a:spLocks/>
+          </p:cNvSpPr>
+          <p:nvPr/>
+        </p:nvSpPr>
+        <p:spPr>
+          <a:xfrm>
+            <a:off x="2014617" y="30868475"/>
+            <a:ext cx="12262817" cy="1125744"/>
+          </a:xfrm>
+          <a:prstGeom prst="rect">
+            <a:avLst/>
+          </a:prstGeom>
+        </p:spPr>
+        <p:txBody>
+          <a:bodyPr vert="horz" lIns="91440" tIns="182880" rIns="91440" bIns="45720" rtlCol="0">
+            <a:noAutofit/>
+          </a:bodyPr>
+          <a:lstStyle>
+            <a:lvl1pPr marL="457200" indent="-457200" algn="l" defTabSz="4389120" rtl="0" eaLnBrk="1" latinLnBrk="0" hangingPunct="1">
+              <a:lnSpc>
+                <a:spcPct val="100000"/>
+              </a:lnSpc>
+              <a:spcBef>
+                <a:spcPts val="1200"/>
+              </a:spcBef>
+              <a:buClr>
+                <a:schemeClr val="accent2"/>
+              </a:buClr>
+              <a:buFont typeface="Arial" panose="020B0604020202020204" pitchFamily="34" charset="0"/>
+              <a:buChar char="•"/>
+              <a:defRPr sz="2800" kern="1200" baseline="0">
+                <a:solidFill>
+                  <a:schemeClr val="tx1"/>
+                </a:solidFill>
+                <a:latin typeface="+mn-lt"/>
+                <a:ea typeface="+mn-ea"/>
+                <a:cs typeface="+mn-cs"/>
+              </a:defRPr>
+            </a:lvl1pPr>
+            <a:lvl2pPr marL="1097280" indent="-457200" algn="l" defTabSz="4389120" rtl="0" eaLnBrk="1" latinLnBrk="0" hangingPunct="1">
+              <a:lnSpc>
+                <a:spcPct val="100000"/>
+              </a:lnSpc>
+              <a:spcBef>
+                <a:spcPts val="1200"/>
+              </a:spcBef>
+              <a:buClr>
+                <a:schemeClr val="accent2"/>
+              </a:buClr>
+              <a:buFont typeface="Arial" panose="020B0604020202020204" pitchFamily="34" charset="0"/>
+              <a:buChar char="•"/>
+              <a:defRPr sz="2400" kern="1200">
+                <a:solidFill>
+                  <a:schemeClr val="tx1"/>
+                </a:solidFill>
+                <a:latin typeface="+mn-lt"/>
+                <a:ea typeface="+mn-ea"/>
+                <a:cs typeface="+mn-cs"/>
+              </a:defRPr>
+            </a:lvl2pPr>
+            <a:lvl3pPr marL="1097280" indent="-457200" algn="l" defTabSz="4389120" rtl="0" eaLnBrk="1" latinLnBrk="0" hangingPunct="1">
+              <a:lnSpc>
+                <a:spcPct val="100000"/>
+              </a:lnSpc>
+              <a:spcBef>
+                <a:spcPts val="1200"/>
+              </a:spcBef>
+              <a:buClr>
+                <a:schemeClr val="accent2"/>
+              </a:buClr>
+              <a:buFont typeface="Arial" panose="020B0604020202020204" pitchFamily="34" charset="0"/>
+              <a:buChar char="•"/>
+              <a:defRPr sz="2400" kern="1200">
+                <a:solidFill>
+                  <a:schemeClr val="tx1"/>
+                </a:solidFill>
+                <a:latin typeface="+mn-lt"/>
+                <a:ea typeface="+mn-ea"/>
+                <a:cs typeface="+mn-cs"/>
+              </a:defRPr>
+            </a:lvl3pPr>
+            <a:lvl4pPr marL="1097280" indent="-457200" algn="l" defTabSz="4389120" rtl="0" eaLnBrk="1" latinLnBrk="0" hangingPunct="1">
+              <a:lnSpc>
+                <a:spcPct val="100000"/>
+              </a:lnSpc>
+              <a:spcBef>
+                <a:spcPts val="1200"/>
+              </a:spcBef>
+              <a:buClr>
+                <a:schemeClr val="accent2"/>
+              </a:buClr>
+              <a:buFont typeface="Arial" panose="020B0604020202020204" pitchFamily="34" charset="0"/>
+              <a:buChar char="•"/>
+              <a:defRPr sz="2400" kern="1200">
+                <a:solidFill>
+                  <a:schemeClr val="tx1"/>
+                </a:solidFill>
+                <a:latin typeface="+mn-lt"/>
+                <a:ea typeface="+mn-ea"/>
+                <a:cs typeface="+mn-cs"/>
+              </a:defRPr>
+            </a:lvl4pPr>
+            <a:lvl5pPr marL="1097280" indent="-457200" algn="l" defTabSz="4389120" rtl="0" eaLnBrk="1" latinLnBrk="0" hangingPunct="1">
+              <a:lnSpc>
+                <a:spcPct val="100000"/>
+              </a:lnSpc>
+              <a:spcBef>
+                <a:spcPts val="1200"/>
+              </a:spcBef>
+              <a:buClr>
+                <a:schemeClr val="accent2"/>
+              </a:buClr>
+              <a:buFont typeface="Arial" panose="020B0604020202020204" pitchFamily="34" charset="0"/>
+              <a:buChar char="•"/>
+              <a:defRPr sz="2400" kern="1200">
+                <a:solidFill>
+                  <a:schemeClr val="tx1"/>
+                </a:solidFill>
+                <a:latin typeface="+mn-lt"/>
+                <a:ea typeface="+mn-ea"/>
+                <a:cs typeface="+mn-cs"/>
+              </a:defRPr>
+            </a:lvl5pPr>
+            <a:lvl6pPr marL="1097280" indent="-457200" algn="l" defTabSz="4389120" rtl="0" eaLnBrk="1" latinLnBrk="0" hangingPunct="1">
+              <a:lnSpc>
+                <a:spcPct val="100000"/>
+              </a:lnSpc>
+              <a:spcBef>
+                <a:spcPts val="1200"/>
+              </a:spcBef>
+              <a:buClr>
+                <a:schemeClr val="accent2"/>
+              </a:buClr>
+              <a:buFont typeface="Arial" panose="020B0604020202020204" pitchFamily="34" charset="0"/>
+              <a:buChar char="•"/>
+              <a:defRPr sz="2400" kern="1200">
+                <a:solidFill>
+                  <a:schemeClr val="tx1"/>
+                </a:solidFill>
+                <a:latin typeface="+mn-lt"/>
+                <a:ea typeface="+mn-ea"/>
+                <a:cs typeface="+mn-cs"/>
+              </a:defRPr>
+            </a:lvl6pPr>
+            <a:lvl7pPr marL="1097280" indent="-457200" algn="l" defTabSz="4389120" rtl="0" eaLnBrk="1" latinLnBrk="0" hangingPunct="1">
+              <a:lnSpc>
+                <a:spcPct val="100000"/>
+              </a:lnSpc>
+              <a:spcBef>
+                <a:spcPts val="1200"/>
+              </a:spcBef>
+              <a:buClr>
+                <a:schemeClr val="accent2"/>
+              </a:buClr>
+              <a:buFont typeface="Arial" panose="020B0604020202020204" pitchFamily="34" charset="0"/>
+              <a:buChar char="•"/>
+              <a:defRPr sz="2400" kern="1200">
+                <a:solidFill>
+                  <a:schemeClr val="tx1"/>
+                </a:solidFill>
+                <a:latin typeface="+mn-lt"/>
+                <a:ea typeface="+mn-ea"/>
+                <a:cs typeface="+mn-cs"/>
+              </a:defRPr>
+            </a:lvl7pPr>
+            <a:lvl8pPr marL="1097280" indent="-457200" algn="l" defTabSz="4389120" rtl="0" eaLnBrk="1" latinLnBrk="0" hangingPunct="1">
+              <a:lnSpc>
+                <a:spcPct val="100000"/>
+              </a:lnSpc>
+              <a:spcBef>
+                <a:spcPts val="1200"/>
+              </a:spcBef>
+              <a:buClr>
+                <a:schemeClr val="accent2"/>
+              </a:buClr>
+              <a:buFont typeface="Arial" panose="020B0604020202020204" pitchFamily="34" charset="0"/>
+              <a:buChar char="•"/>
+              <a:defRPr sz="2400" kern="1200">
+                <a:solidFill>
+                  <a:schemeClr val="tx1"/>
+                </a:solidFill>
+                <a:latin typeface="+mn-lt"/>
+                <a:ea typeface="+mn-ea"/>
+                <a:cs typeface="+mn-cs"/>
+              </a:defRPr>
+            </a:lvl8pPr>
+            <a:lvl9pPr marL="1097280" indent="-457200" algn="l" defTabSz="4389120" rtl="0" eaLnBrk="1" latinLnBrk="0" hangingPunct="1">
+              <a:lnSpc>
+                <a:spcPct val="100000"/>
+              </a:lnSpc>
+              <a:spcBef>
+                <a:spcPts val="1200"/>
+              </a:spcBef>
+              <a:buClr>
+                <a:schemeClr val="accent2"/>
+              </a:buClr>
+              <a:buFont typeface="Arial" panose="020B0604020202020204" pitchFamily="34" charset="0"/>
+              <a:buChar char="•"/>
+              <a:defRPr sz="2400" kern="1200">
+                <a:solidFill>
+                  <a:schemeClr val="tx1"/>
+                </a:solidFill>
+                <a:latin typeface="+mn-lt"/>
+                <a:ea typeface="+mn-ea"/>
+                <a:cs typeface="+mn-cs"/>
+              </a:defRPr>
+            </a:lvl9pPr>
+          </a:lstStyle>
+          <a:p>
+            <a:pPr marL="0" indent="0" algn="ctr">
+              <a:buFont typeface="Arial" panose="020B0604020202020204" pitchFamily="34" charset="0"/>
+              <a:buNone/>
+            </a:pPr>
+            <a:r>
+              <a:rPr lang="en-US" b="1" dirty="0"/>
+              <a:t>Figure 1</a:t>
+            </a:r>
+            <a:r>
+              <a:rPr lang="en-US" dirty="0"/>
+              <a:t>: Token and statement similarity for University-A. Almost all configurations were composed of the same set of unique tokens.</a:t>
+            </a:r>
+          </a:p>
+        </p:txBody>
+      </p:sp>
+      <p:pic>
+        <p:nvPicPr>
+          <p:cNvPr id="59" name="Picture 58">
+            <a:extLst>
+              <a:ext uri="{FF2B5EF4-FFF2-40B4-BE49-F238E27FC236}">
+                <a16:creationId xmlns:a16="http://schemas.microsoft.com/office/drawing/2014/main" xmlns="" id="{57E7F990-BAF4-6E41-B55F-E8BC8D4051AB}"/>
+              </a:ext>
+            </a:extLst>
+          </p:cNvPr>
+          <p:cNvPicPr>
+            <a:picLocks noChangeAspect="1"/>
+          </p:cNvPicPr>
+          <p:nvPr/>
+        </p:nvPicPr>
+        <p:blipFill>
+          <a:blip r:embed="rId6">
+            <a:extLst>
+              <a:ext uri="{28A0092B-C50C-407E-A947-70E740481C1C}">
+                <a14:useLocalDpi xmlns:a14="http://schemas.microsoft.com/office/drawing/2010/main" val="0"/>
+              </a:ext>
+            </a:extLst>
+          </a:blip>
+          <a:stretch>
+            <a:fillRect/>
+          </a:stretch>
+        </p:blipFill>
+        <p:spPr>
+          <a:xfrm>
+            <a:off x="1422792" y="22298349"/>
+            <a:ext cx="12918482" cy="7980632"/>
+          </a:xfrm>
+          <a:prstGeom prst="rect">
+            <a:avLst/>
+          </a:prstGeom>
+        </p:spPr>
+      </p:pic>
+      <p:sp>
+        <p:nvSpPr>
           <p:cNvPr id="69" name="Text Placeholder 6">
             <a:extLst>
               <a:ext uri="{FF2B5EF4-FFF2-40B4-BE49-F238E27FC236}">
@@ -18768,7 +19400,7 @@
         </p:nvSpPr>
         <p:spPr>
           <a:xfrm>
-            <a:off x="15908304" y="5852160"/>
+            <a:off x="15992064" y="5377690"/>
             <a:ext cx="12801600" cy="1219200"/>
           </a:xfrm>
           <a:prstGeom prst="round1Rect">
@@ -18981,751 +19613,6 @@
           </a:p>
         </p:txBody>
       </p:sp>
-      <p:sp>
-        <p:nvSpPr>
-          <p:cNvPr id="4" name="Title 3"/>
-          <p:cNvSpPr>
-            <a:spLocks noGrp="1"/>
-          </p:cNvSpPr>
-          <p:nvPr>
-            <p:ph type="title"/>
-          </p:nvPr>
-        </p:nvSpPr>
-        <p:spPr>
-          <a:xfrm>
-            <a:off x="6400800" y="328630"/>
-            <a:ext cx="31089600" cy="2514540"/>
-          </a:xfrm>
-        </p:spPr>
-        <p:txBody>
-          <a:bodyPr>
-            <a:noAutofit/>
-          </a:bodyPr>
-          <a:lstStyle/>
-          <a:p>
-            <a:r>
-              <a:rPr lang="en-US" sz="9600" dirty="0"/>
-              <a:t>Auto-completion for Network Configurations</a:t>
-            </a:r>
-          </a:p>
-        </p:txBody>
-      </p:sp>
-      <p:sp>
-        <p:nvSpPr>
-          <p:cNvPr id="5" name="Text Placeholder 4"/>
-          <p:cNvSpPr>
-            <a:spLocks noGrp="1"/>
-          </p:cNvSpPr>
-          <p:nvPr>
-            <p:ph type="body" sz="quarter" idx="13"/>
-          </p:nvPr>
-        </p:nvSpPr>
-        <p:spPr/>
-        <p:txBody>
-          <a:bodyPr/>
-          <a:lstStyle/>
-          <a:p>
-            <a:r>
-              <a:rPr lang="en-US" dirty="0"/>
-              <a:t>Introduction</a:t>
-            </a:r>
-          </a:p>
-        </p:txBody>
-      </p:sp>
-      <p:sp>
-        <p:nvSpPr>
-          <p:cNvPr id="11" name="Content Placeholder 10"/>
-          <p:cNvSpPr>
-            <a:spLocks noGrp="1"/>
-          </p:cNvSpPr>
-          <p:nvPr>
-            <p:ph sz="quarter" idx="24"/>
-          </p:nvPr>
-        </p:nvSpPr>
-        <p:spPr>
-          <a:xfrm>
-            <a:off x="1261309" y="12273074"/>
-            <a:ext cx="12107781" cy="2674369"/>
-          </a:xfrm>
-        </p:spPr>
-        <p:txBody>
-          <a:bodyPr>
-            <a:noAutofit/>
-          </a:bodyPr>
-          <a:lstStyle/>
-          <a:p>
-            <a:r>
-              <a:rPr lang="en-US" sz="2800" dirty="0"/>
-              <a:t>State of the art tools offer simple tab-completion and preset templates</a:t>
-            </a:r>
-          </a:p>
-          <a:p>
-            <a:r>
-              <a:rPr lang="en-US" sz="2800" dirty="0"/>
-              <a:t>We predict a code completion engine would offer better resilience to human errors</a:t>
-            </a:r>
-          </a:p>
-          <a:p>
-            <a:endParaRPr lang="en-US" sz="2800" dirty="0"/>
-          </a:p>
-          <a:p>
-            <a:endParaRPr lang="en-US" sz="2800" dirty="0"/>
-          </a:p>
-        </p:txBody>
-      </p:sp>
-      <p:sp>
-        <p:nvSpPr>
-          <p:cNvPr id="7" name="Text Placeholder 6"/>
-          <p:cNvSpPr>
-            <a:spLocks noGrp="1"/>
-          </p:cNvSpPr>
-          <p:nvPr>
-            <p:ph type="body" sz="quarter" idx="17"/>
-          </p:nvPr>
-        </p:nvSpPr>
-        <p:spPr>
-          <a:xfrm>
-            <a:off x="1435894" y="15551406"/>
-            <a:ext cx="12801600" cy="1219200"/>
-          </a:xfrm>
-        </p:spPr>
-        <p:txBody>
-          <a:bodyPr/>
-          <a:lstStyle/>
-          <a:p>
-            <a:r>
-              <a:rPr lang="en-US" dirty="0"/>
-              <a:t>Feasibility analysis</a:t>
-            </a:r>
-          </a:p>
-        </p:txBody>
-      </p:sp>
-      <p:sp>
-        <p:nvSpPr>
-          <p:cNvPr id="56" name="Content Placeholder 55">
-            <a:extLst>
-              <a:ext uri="{FF2B5EF4-FFF2-40B4-BE49-F238E27FC236}">
-                <a16:creationId xmlns:a16="http://schemas.microsoft.com/office/drawing/2014/main" xmlns="" id="{D2B8C290-3994-9B4E-A1E5-40D781DA7147}"/>
-              </a:ext>
-            </a:extLst>
-          </p:cNvPr>
-          <p:cNvSpPr>
-            <a:spLocks noGrp="1"/>
-          </p:cNvSpPr>
-          <p:nvPr>
-            <p:ph sz="quarter" idx="25"/>
-          </p:nvPr>
-        </p:nvSpPr>
-        <p:spPr>
-          <a:xfrm>
-            <a:off x="1143000" y="17314801"/>
-            <a:ext cx="12801600" cy="4936178"/>
-          </a:xfrm>
-        </p:spPr>
-        <p:txBody>
-          <a:bodyPr>
-            <a:normAutofit/>
-          </a:bodyPr>
-          <a:lstStyle/>
-          <a:p>
-            <a:r>
-              <a:rPr lang="en-US" sz="2800" dirty="0"/>
-              <a:t>Previous measurement studies have revealed extensive use of templates in network </a:t>
-            </a:r>
-            <a:r>
-              <a:rPr lang="en-US" sz="2800" dirty="0" smtClean="0"/>
-              <a:t>configurations [1]</a:t>
-            </a:r>
-            <a:endParaRPr lang="en-US" sz="2800" dirty="0"/>
-          </a:p>
-          <a:p>
-            <a:r>
-              <a:rPr lang="en-US" sz="2800" dirty="0"/>
-              <a:t>Our observations indicate that most of a device’s configuration could be constructed from existing configurations</a:t>
-            </a:r>
-          </a:p>
-          <a:p>
-            <a:r>
-              <a:rPr lang="en-US" sz="2800" dirty="0"/>
-              <a:t>Our prediction engine thus constructs a model from histories of configurations</a:t>
-            </a:r>
-          </a:p>
-          <a:p>
-            <a:pPr marL="0" indent="0">
-              <a:buNone/>
-            </a:pPr>
-            <a:endParaRPr lang="en-US" sz="2800" dirty="0"/>
-          </a:p>
-        </p:txBody>
-      </p:sp>
-      <p:sp>
-        <p:nvSpPr>
-          <p:cNvPr id="18" name="Text Placeholder 17"/>
-          <p:cNvSpPr>
-            <a:spLocks noGrp="1"/>
-          </p:cNvSpPr>
-          <p:nvPr>
-            <p:ph type="body" sz="quarter" idx="29"/>
-          </p:nvPr>
-        </p:nvSpPr>
-        <p:spPr>
-          <a:xfrm>
-            <a:off x="15892103" y="11925176"/>
-            <a:ext cx="12801600" cy="1219200"/>
-          </a:xfrm>
-        </p:spPr>
-        <p:txBody>
-          <a:bodyPr/>
-          <a:lstStyle/>
-          <a:p>
-            <a:r>
-              <a:rPr lang="en-US" dirty="0"/>
-              <a:t>placeholders</a:t>
-            </a:r>
-          </a:p>
-        </p:txBody>
-      </p:sp>
-      <p:pic>
-        <p:nvPicPr>
-          <p:cNvPr id="26" name="Content Placeholder 25">
-            <a:extLst>
-              <a:ext uri="{FF2B5EF4-FFF2-40B4-BE49-F238E27FC236}">
-                <a16:creationId xmlns:a16="http://schemas.microsoft.com/office/drawing/2014/main" xmlns="" id="{B4AADA20-9EC6-694F-BFAC-033242EDA257}"/>
-              </a:ext>
-            </a:extLst>
-          </p:cNvPr>
-          <p:cNvPicPr>
-            <a:picLocks noGrp="1" noChangeAspect="1"/>
-          </p:cNvPicPr>
-          <p:nvPr>
-            <p:ph sz="quarter" idx="30"/>
-          </p:nvPr>
-        </p:nvPicPr>
-        <p:blipFill>
-          <a:blip r:embed="rId5">
-            <a:extLst>
-              <a:ext uri="{28A0092B-C50C-407E-A947-70E740481C1C}">
-                <a14:useLocalDpi xmlns:a14="http://schemas.microsoft.com/office/drawing/2010/main" val="0"/>
-              </a:ext>
-            </a:extLst>
-          </a:blip>
-          <a:stretch>
-            <a:fillRect/>
-          </a:stretch>
-        </p:blipFill>
-        <p:spPr>
-          <a:xfrm>
-            <a:off x="29900880" y="7344462"/>
-            <a:ext cx="6629083" cy="5303266"/>
-          </a:xfrm>
-        </p:spPr>
-      </p:pic>
-      <p:sp>
-        <p:nvSpPr>
-          <p:cNvPr id="21" name="Text Placeholder 20"/>
-          <p:cNvSpPr>
-            <a:spLocks noGrp="1"/>
-          </p:cNvSpPr>
-          <p:nvPr>
-            <p:ph type="body" sz="quarter" idx="31"/>
-          </p:nvPr>
-        </p:nvSpPr>
-        <p:spPr/>
-        <p:txBody>
-          <a:bodyPr/>
-          <a:lstStyle/>
-          <a:p>
-            <a:r>
-              <a:rPr lang="en-US" dirty="0"/>
-              <a:t>Results</a:t>
-            </a:r>
-          </a:p>
-        </p:txBody>
-      </p:sp>
-      <p:sp>
-        <p:nvSpPr>
-          <p:cNvPr id="23" name="Text Placeholder 22"/>
-          <p:cNvSpPr>
-            <a:spLocks noGrp="1"/>
-          </p:cNvSpPr>
-          <p:nvPr>
-            <p:ph type="body" sz="quarter" idx="34"/>
-          </p:nvPr>
-        </p:nvSpPr>
-        <p:spPr>
-          <a:xfrm>
-            <a:off x="29821367" y="23765604"/>
-            <a:ext cx="12801600" cy="1219200"/>
-          </a:xfrm>
-        </p:spPr>
-        <p:txBody>
-          <a:bodyPr/>
-          <a:lstStyle/>
-          <a:p>
-            <a:r>
-              <a:rPr lang="en-US" dirty="0"/>
-              <a:t>Future work</a:t>
-            </a:r>
-          </a:p>
-        </p:txBody>
-      </p:sp>
-      <p:sp>
-        <p:nvSpPr>
-          <p:cNvPr id="43" name="TextBox 42">
-            <a:extLst>
-              <a:ext uri="{FF2B5EF4-FFF2-40B4-BE49-F238E27FC236}">
-                <a16:creationId xmlns:a16="http://schemas.microsoft.com/office/drawing/2014/main" xmlns="" id="{5DAC9B42-A965-2E4B-9E51-395D6D01FD7B}"/>
-              </a:ext>
-            </a:extLst>
-          </p:cNvPr>
-          <p:cNvSpPr txBox="1"/>
-          <p:nvPr/>
-        </p:nvSpPr>
-        <p:spPr>
-          <a:xfrm>
-            <a:off x="30549693" y="12744569"/>
-            <a:ext cx="5360100" cy="3108543"/>
-          </a:xfrm>
-          <a:prstGeom prst="rect">
-            <a:avLst/>
-          </a:prstGeom>
-          <a:noFill/>
-        </p:spPr>
-        <p:txBody>
-          <a:bodyPr wrap="square" rtlCol="0">
-            <a:spAutoFit/>
-          </a:bodyPr>
-          <a:lstStyle/>
-          <a:p>
-            <a:r>
-              <a:rPr lang="en-US" sz="2800" b="1" dirty="0"/>
-              <a:t>Figure </a:t>
-            </a:r>
-            <a:r>
-              <a:rPr lang="en-US" sz="2800" b="1" dirty="0" smtClean="0"/>
-              <a:t>3</a:t>
-            </a:r>
-            <a:r>
-              <a:rPr lang="en-US" sz="2800" dirty="0" smtClean="0"/>
-              <a:t>: Our </a:t>
-            </a:r>
-            <a:r>
-              <a:rPr lang="en-US" sz="2800" dirty="0"/>
-              <a:t>approach achieves a high prediction accuracy (&gt;85%) for the majority of routers. Without our placeholders optimization, this accuracy is 5% lower. </a:t>
-            </a:r>
-          </a:p>
-          <a:p>
-            <a:endParaRPr lang="en-US" sz="2800" b="1" dirty="0"/>
-          </a:p>
-        </p:txBody>
-      </p:sp>
-      <p:sp>
-        <p:nvSpPr>
-          <p:cNvPr id="44" name="TextBox 43">
-            <a:extLst>
-              <a:ext uri="{FF2B5EF4-FFF2-40B4-BE49-F238E27FC236}">
-                <a16:creationId xmlns:a16="http://schemas.microsoft.com/office/drawing/2014/main" xmlns="" id="{1BC94FAF-F442-FA46-AD71-53749FA6AB04}"/>
-              </a:ext>
-            </a:extLst>
-          </p:cNvPr>
-          <p:cNvSpPr txBox="1"/>
-          <p:nvPr/>
-        </p:nvSpPr>
-        <p:spPr>
-          <a:xfrm>
-            <a:off x="30549694" y="17639990"/>
-            <a:ext cx="5548956" cy="3908762"/>
-          </a:xfrm>
-          <a:prstGeom prst="rect">
-            <a:avLst/>
-          </a:prstGeom>
-          <a:noFill/>
-        </p:spPr>
-        <p:txBody>
-          <a:bodyPr wrap="square" rtlCol="0">
-            <a:spAutoFit/>
-          </a:bodyPr>
-          <a:lstStyle/>
-          <a:p>
-            <a:r>
-              <a:rPr lang="en-US" sz="2800" b="1" dirty="0"/>
-              <a:t>Figure </a:t>
-            </a:r>
-            <a:r>
-              <a:rPr lang="en-US" sz="2800" b="1" dirty="0" smtClean="0"/>
-              <a:t>5 </a:t>
-            </a:r>
-            <a:r>
-              <a:rPr lang="en-US" sz="2800" b="1" dirty="0" smtClean="0"/>
-              <a:t>(Right</a:t>
-            </a:r>
-            <a:r>
-              <a:rPr lang="en-US" sz="2800" b="1" dirty="0"/>
-              <a:t>)</a:t>
-            </a:r>
-            <a:r>
-              <a:rPr lang="en-US" sz="2800" dirty="0"/>
-              <a:t>:  Training on more devices results in higher accuracies. However, training on more devices has diminishing re- turns, because additional devices play the same role as existing devices, and hence are very similar.</a:t>
-            </a:r>
-          </a:p>
-          <a:p>
-            <a:endParaRPr lang="en-US" sz="2400" b="1" dirty="0"/>
-          </a:p>
-        </p:txBody>
-      </p:sp>
-      <p:pic>
-        <p:nvPicPr>
-          <p:cNvPr id="46" name="Picture 45">
-            <a:extLst>
-              <a:ext uri="{FF2B5EF4-FFF2-40B4-BE49-F238E27FC236}">
-                <a16:creationId xmlns:a16="http://schemas.microsoft.com/office/drawing/2014/main" xmlns="" id="{B367DB67-8216-AF48-98CF-E9D59512777D}"/>
-              </a:ext>
-            </a:extLst>
-          </p:cNvPr>
-          <p:cNvPicPr>
-            <a:picLocks noChangeAspect="1"/>
-          </p:cNvPicPr>
-          <p:nvPr/>
-        </p:nvPicPr>
-        <p:blipFill>
-          <a:blip r:embed="rId6">
-            <a:extLst>
-              <a:ext uri="{28A0092B-C50C-407E-A947-70E740481C1C}">
-                <a14:useLocalDpi xmlns:a14="http://schemas.microsoft.com/office/drawing/2010/main" val="0"/>
-              </a:ext>
-            </a:extLst>
-          </a:blip>
-          <a:stretch>
-            <a:fillRect/>
-          </a:stretch>
-        </p:blipFill>
-        <p:spPr>
-          <a:xfrm>
-            <a:off x="36088240" y="7487088"/>
-            <a:ext cx="7314169" cy="5125257"/>
-          </a:xfrm>
-          <a:prstGeom prst="rect">
-            <a:avLst/>
-          </a:prstGeom>
-        </p:spPr>
-      </p:pic>
-      <p:sp>
-        <p:nvSpPr>
-          <p:cNvPr id="47" name="TextBox 46">
-            <a:extLst>
-              <a:ext uri="{FF2B5EF4-FFF2-40B4-BE49-F238E27FC236}">
-                <a16:creationId xmlns:a16="http://schemas.microsoft.com/office/drawing/2014/main" xmlns="" id="{D10EC450-98A6-A14B-A4F9-F634878E3EFE}"/>
-              </a:ext>
-            </a:extLst>
-          </p:cNvPr>
-          <p:cNvSpPr txBox="1"/>
-          <p:nvPr/>
-        </p:nvSpPr>
-        <p:spPr>
-          <a:xfrm>
-            <a:off x="36900465" y="12743590"/>
-            <a:ext cx="5722502" cy="1815882"/>
-          </a:xfrm>
-          <a:prstGeom prst="rect">
-            <a:avLst/>
-          </a:prstGeom>
-          <a:noFill/>
-        </p:spPr>
-        <p:txBody>
-          <a:bodyPr wrap="square" rtlCol="0">
-            <a:spAutoFit/>
-          </a:bodyPr>
-          <a:lstStyle/>
-          <a:p>
-            <a:r>
-              <a:rPr lang="en-US" sz="2800" b="1" dirty="0"/>
-              <a:t>Figure </a:t>
-            </a:r>
-            <a:r>
-              <a:rPr lang="en-US" sz="2800" b="1" dirty="0" smtClean="0"/>
-              <a:t>4</a:t>
-            </a:r>
-            <a:r>
-              <a:rPr lang="en-US" sz="2800" dirty="0" smtClean="0"/>
-              <a:t>: </a:t>
-            </a:r>
-            <a:r>
-              <a:rPr lang="en-US" sz="2800" dirty="0"/>
-              <a:t>Our framework does not require a long history of configurations to achieve reasonable accuracy. </a:t>
-            </a:r>
-          </a:p>
-        </p:txBody>
-      </p:sp>
-      <p:sp>
-        <p:nvSpPr>
-          <p:cNvPr id="58" name="Content Placeholder 14">
-            <a:extLst>
-              <a:ext uri="{FF2B5EF4-FFF2-40B4-BE49-F238E27FC236}">
-                <a16:creationId xmlns:a16="http://schemas.microsoft.com/office/drawing/2014/main" xmlns="" id="{53153977-76FF-3649-9E56-5A02CD01D677}"/>
-              </a:ext>
-            </a:extLst>
-          </p:cNvPr>
-          <p:cNvSpPr txBox="1">
-            <a:spLocks/>
-          </p:cNvSpPr>
-          <p:nvPr/>
-        </p:nvSpPr>
-        <p:spPr>
-          <a:xfrm>
-            <a:off x="1258705" y="29784136"/>
-            <a:ext cx="12661106" cy="1303867"/>
-          </a:xfrm>
-          <a:prstGeom prst="rect">
-            <a:avLst/>
-          </a:prstGeom>
-        </p:spPr>
-        <p:txBody>
-          <a:bodyPr vert="horz" lIns="91440" tIns="182880" rIns="91440" bIns="45720" rtlCol="0">
-            <a:noAutofit/>
-          </a:bodyPr>
-          <a:lstStyle>
-            <a:lvl1pPr marL="457200" indent="-457200" algn="l" defTabSz="4389120" rtl="0" eaLnBrk="1" latinLnBrk="0" hangingPunct="1">
-              <a:lnSpc>
-                <a:spcPct val="100000"/>
-              </a:lnSpc>
-              <a:spcBef>
-                <a:spcPts val="1200"/>
-              </a:spcBef>
-              <a:buClr>
-                <a:schemeClr val="accent2"/>
-              </a:buClr>
-              <a:buFont typeface="Arial" panose="020B0604020202020204" pitchFamily="34" charset="0"/>
-              <a:buChar char="•"/>
-              <a:defRPr sz="2800" kern="1200" baseline="0">
-                <a:solidFill>
-                  <a:schemeClr val="tx1"/>
-                </a:solidFill>
-                <a:latin typeface="+mn-lt"/>
-                <a:ea typeface="+mn-ea"/>
-                <a:cs typeface="+mn-cs"/>
-              </a:defRPr>
-            </a:lvl1pPr>
-            <a:lvl2pPr marL="1097280" indent="-457200" algn="l" defTabSz="4389120" rtl="0" eaLnBrk="1" latinLnBrk="0" hangingPunct="1">
-              <a:lnSpc>
-                <a:spcPct val="100000"/>
-              </a:lnSpc>
-              <a:spcBef>
-                <a:spcPts val="1200"/>
-              </a:spcBef>
-              <a:buClr>
-                <a:schemeClr val="accent2"/>
-              </a:buClr>
-              <a:buFont typeface="Arial" panose="020B0604020202020204" pitchFamily="34" charset="0"/>
-              <a:buChar char="•"/>
-              <a:defRPr sz="2400" kern="1200">
-                <a:solidFill>
-                  <a:schemeClr val="tx1"/>
-                </a:solidFill>
-                <a:latin typeface="+mn-lt"/>
-                <a:ea typeface="+mn-ea"/>
-                <a:cs typeface="+mn-cs"/>
-              </a:defRPr>
-            </a:lvl2pPr>
-            <a:lvl3pPr marL="1097280" indent="-457200" algn="l" defTabSz="4389120" rtl="0" eaLnBrk="1" latinLnBrk="0" hangingPunct="1">
-              <a:lnSpc>
-                <a:spcPct val="100000"/>
-              </a:lnSpc>
-              <a:spcBef>
-                <a:spcPts val="1200"/>
-              </a:spcBef>
-              <a:buClr>
-                <a:schemeClr val="accent2"/>
-              </a:buClr>
-              <a:buFont typeface="Arial" panose="020B0604020202020204" pitchFamily="34" charset="0"/>
-              <a:buChar char="•"/>
-              <a:defRPr sz="2400" kern="1200">
-                <a:solidFill>
-                  <a:schemeClr val="tx1"/>
-                </a:solidFill>
-                <a:latin typeface="+mn-lt"/>
-                <a:ea typeface="+mn-ea"/>
-                <a:cs typeface="+mn-cs"/>
-              </a:defRPr>
-            </a:lvl3pPr>
-            <a:lvl4pPr marL="1097280" indent="-457200" algn="l" defTabSz="4389120" rtl="0" eaLnBrk="1" latinLnBrk="0" hangingPunct="1">
-              <a:lnSpc>
-                <a:spcPct val="100000"/>
-              </a:lnSpc>
-              <a:spcBef>
-                <a:spcPts val="1200"/>
-              </a:spcBef>
-              <a:buClr>
-                <a:schemeClr val="accent2"/>
-              </a:buClr>
-              <a:buFont typeface="Arial" panose="020B0604020202020204" pitchFamily="34" charset="0"/>
-              <a:buChar char="•"/>
-              <a:defRPr sz="2400" kern="1200">
-                <a:solidFill>
-                  <a:schemeClr val="tx1"/>
-                </a:solidFill>
-                <a:latin typeface="+mn-lt"/>
-                <a:ea typeface="+mn-ea"/>
-                <a:cs typeface="+mn-cs"/>
-              </a:defRPr>
-            </a:lvl4pPr>
-            <a:lvl5pPr marL="1097280" indent="-457200" algn="l" defTabSz="4389120" rtl="0" eaLnBrk="1" latinLnBrk="0" hangingPunct="1">
-              <a:lnSpc>
-                <a:spcPct val="100000"/>
-              </a:lnSpc>
-              <a:spcBef>
-                <a:spcPts val="1200"/>
-              </a:spcBef>
-              <a:buClr>
-                <a:schemeClr val="accent2"/>
-              </a:buClr>
-              <a:buFont typeface="Arial" panose="020B0604020202020204" pitchFamily="34" charset="0"/>
-              <a:buChar char="•"/>
-              <a:defRPr sz="2400" kern="1200">
-                <a:solidFill>
-                  <a:schemeClr val="tx1"/>
-                </a:solidFill>
-                <a:latin typeface="+mn-lt"/>
-                <a:ea typeface="+mn-ea"/>
-                <a:cs typeface="+mn-cs"/>
-              </a:defRPr>
-            </a:lvl5pPr>
-            <a:lvl6pPr marL="1097280" indent="-457200" algn="l" defTabSz="4389120" rtl="0" eaLnBrk="1" latinLnBrk="0" hangingPunct="1">
-              <a:lnSpc>
-                <a:spcPct val="100000"/>
-              </a:lnSpc>
-              <a:spcBef>
-                <a:spcPts val="1200"/>
-              </a:spcBef>
-              <a:buClr>
-                <a:schemeClr val="accent2"/>
-              </a:buClr>
-              <a:buFont typeface="Arial" panose="020B0604020202020204" pitchFamily="34" charset="0"/>
-              <a:buChar char="•"/>
-              <a:defRPr sz="2400" kern="1200">
-                <a:solidFill>
-                  <a:schemeClr val="tx1"/>
-                </a:solidFill>
-                <a:latin typeface="+mn-lt"/>
-                <a:ea typeface="+mn-ea"/>
-                <a:cs typeface="+mn-cs"/>
-              </a:defRPr>
-            </a:lvl6pPr>
-            <a:lvl7pPr marL="1097280" indent="-457200" algn="l" defTabSz="4389120" rtl="0" eaLnBrk="1" latinLnBrk="0" hangingPunct="1">
-              <a:lnSpc>
-                <a:spcPct val="100000"/>
-              </a:lnSpc>
-              <a:spcBef>
-                <a:spcPts val="1200"/>
-              </a:spcBef>
-              <a:buClr>
-                <a:schemeClr val="accent2"/>
-              </a:buClr>
-              <a:buFont typeface="Arial" panose="020B0604020202020204" pitchFamily="34" charset="0"/>
-              <a:buChar char="•"/>
-              <a:defRPr sz="2400" kern="1200">
-                <a:solidFill>
-                  <a:schemeClr val="tx1"/>
-                </a:solidFill>
-                <a:latin typeface="+mn-lt"/>
-                <a:ea typeface="+mn-ea"/>
-                <a:cs typeface="+mn-cs"/>
-              </a:defRPr>
-            </a:lvl7pPr>
-            <a:lvl8pPr marL="1097280" indent="-457200" algn="l" defTabSz="4389120" rtl="0" eaLnBrk="1" latinLnBrk="0" hangingPunct="1">
-              <a:lnSpc>
-                <a:spcPct val="100000"/>
-              </a:lnSpc>
-              <a:spcBef>
-                <a:spcPts val="1200"/>
-              </a:spcBef>
-              <a:buClr>
-                <a:schemeClr val="accent2"/>
-              </a:buClr>
-              <a:buFont typeface="Arial" panose="020B0604020202020204" pitchFamily="34" charset="0"/>
-              <a:buChar char="•"/>
-              <a:defRPr sz="2400" kern="1200">
-                <a:solidFill>
-                  <a:schemeClr val="tx1"/>
-                </a:solidFill>
-                <a:latin typeface="+mn-lt"/>
-                <a:ea typeface="+mn-ea"/>
-                <a:cs typeface="+mn-cs"/>
-              </a:defRPr>
-            </a:lvl8pPr>
-            <a:lvl9pPr marL="1097280" indent="-457200" algn="l" defTabSz="4389120" rtl="0" eaLnBrk="1" latinLnBrk="0" hangingPunct="1">
-              <a:lnSpc>
-                <a:spcPct val="100000"/>
-              </a:lnSpc>
-              <a:spcBef>
-                <a:spcPts val="1200"/>
-              </a:spcBef>
-              <a:buClr>
-                <a:schemeClr val="accent2"/>
-              </a:buClr>
-              <a:buFont typeface="Arial" panose="020B0604020202020204" pitchFamily="34" charset="0"/>
-              <a:buChar char="•"/>
-              <a:defRPr sz="2400" kern="1200">
-                <a:solidFill>
-                  <a:schemeClr val="tx1"/>
-                </a:solidFill>
-                <a:latin typeface="+mn-lt"/>
-                <a:ea typeface="+mn-ea"/>
-                <a:cs typeface="+mn-cs"/>
-              </a:defRPr>
-            </a:lvl9pPr>
-          </a:lstStyle>
-          <a:p>
-            <a:pPr marL="0" indent="0" algn="ctr">
-              <a:buFont typeface="Arial" panose="020B0604020202020204" pitchFamily="34" charset="0"/>
-              <a:buNone/>
-            </a:pPr>
-            <a:r>
-              <a:rPr lang="en-US" b="1" dirty="0"/>
-              <a:t>Figure 1</a:t>
-            </a:r>
-            <a:r>
-              <a:rPr lang="en-US" dirty="0"/>
-              <a:t>: Token and statement similarity for University-A. Almost all configurations were composed of the same set of unique tokens.</a:t>
-            </a:r>
-          </a:p>
-        </p:txBody>
-      </p:sp>
-      <p:pic>
-        <p:nvPicPr>
-          <p:cNvPr id="59" name="Picture 58">
-            <a:extLst>
-              <a:ext uri="{FF2B5EF4-FFF2-40B4-BE49-F238E27FC236}">
-                <a16:creationId xmlns:a16="http://schemas.microsoft.com/office/drawing/2014/main" xmlns="" id="{57E7F990-BAF4-6E41-B55F-E8BC8D4051AB}"/>
-              </a:ext>
-            </a:extLst>
-          </p:cNvPr>
-          <p:cNvPicPr>
-            <a:picLocks noChangeAspect="1"/>
-          </p:cNvPicPr>
-          <p:nvPr/>
-        </p:nvPicPr>
-        <p:blipFill>
-          <a:blip r:embed="rId7">
-            <a:extLst>
-              <a:ext uri="{28A0092B-C50C-407E-A947-70E740481C1C}">
-                <a14:useLocalDpi xmlns:a14="http://schemas.microsoft.com/office/drawing/2010/main" val="0"/>
-              </a:ext>
-            </a:extLst>
-          </a:blip>
-          <a:stretch>
-            <a:fillRect/>
-          </a:stretch>
-        </p:blipFill>
-        <p:spPr>
-          <a:xfrm>
-            <a:off x="1622990" y="21635837"/>
-            <a:ext cx="12419563" cy="7672415"/>
-          </a:xfrm>
-          <a:prstGeom prst="rect">
-            <a:avLst/>
-          </a:prstGeom>
-        </p:spPr>
-      </p:pic>
       <p:pic>
         <p:nvPicPr>
           <p:cNvPr id="1030" name="Picture 6" descr="https://lh6.googleusercontent.com/U8DiTENPHbhVFyljAq94uRFV2j_REAqu-mIH0c0-MYVDIvBDCEIL8TCDJgtjl8u-SPEsg4R4YjqmELxpy1sqkNuNnOprJt1SvQIrwvLKUaMoHlaPlNuAe7I4Rumgo1CvRQAxWIkQF3g">
@@ -19741,7 +19628,7 @@
           <p:nvPr/>
         </p:nvPicPr>
         <p:blipFill>
-          <a:blip r:embed="rId8">
+          <a:blip r:embed="rId7">
             <a:extLst>
               <a:ext uri="{28A0092B-C50C-407E-A947-70E740481C1C}">
                 <a14:useLocalDpi xmlns:a14="http://schemas.microsoft.com/office/drawing/2010/main" val="0"/>
@@ -20277,7 +20164,7 @@
         </p:nvSpPr>
         <p:spPr>
           <a:xfrm>
-            <a:off x="29741854" y="25116049"/>
+            <a:off x="29741854" y="24274220"/>
             <a:ext cx="12642574" cy="3603845"/>
           </a:xfrm>
           <a:prstGeom prst="rect">
@@ -20286,7 +20173,7 @@
         </p:spPr>
         <p:txBody>
           <a:bodyPr vert="horz" lIns="365760" tIns="182880" rIns="91440" bIns="45720" rtlCol="0">
-            <a:normAutofit fontScale="62500" lnSpcReduction="20000"/>
+            <a:normAutofit/>
           </a:bodyPr>
           <a:lstStyle>
             <a:lvl1pPr marL="822960" indent="-822960" algn="l" defTabSz="3291840" rtl="0" eaLnBrk="1" latinLnBrk="0" hangingPunct="1">
@@ -20498,28 +20385,32 @@
             </a:lvl9pPr>
           </a:lstStyle>
           <a:p>
-            <a:pPr marL="0" indent="0">
-              <a:buNone/>
-            </a:pPr>
             <a:r>
-              <a:rPr lang="en-US" sz="4500" dirty="0"/>
-              <a:t>Our analyses help direct our attention towards areas of improvements for the model. The variance seen in our device analysis suggests that having different models for </a:t>
+              <a:rPr lang="en-US" sz="2800" dirty="0"/>
+              <a:t>Evaluate our model against the current state of the art: tab-completion in CLIs on modern routers</a:t>
             </a:r>
+          </a:p>
+          <a:p>
             <a:r>
-              <a:rPr lang="en-US" sz="4500" dirty="0" smtClean="0"/>
-              <a:t>routers </a:t>
+              <a:rPr lang="en-US" sz="2800" dirty="0"/>
+              <a:t>Using larger n-grams to suggest complete statements</a:t>
             </a:r>
+          </a:p>
+          <a:p>
             <a:r>
-              <a:rPr lang="en-US" sz="4500" dirty="0"/>
-              <a:t>of different ”roles” could help improve prediction accuracies. Additionally, we plan on exploring the possibility of using larger n-grams to suggest complete statements. Lastly, we hope to evaluate our model against the current state of the art: tab-completion in CLIs on modern routers. </a:t>
+              <a:rPr lang="en-US" sz="2800" dirty="0"/>
+              <a:t>Stanza specific models</a:t>
             </a:r>
+          </a:p>
+          <a:p>
+            <a:endParaRPr lang="en-US" sz="2800" dirty="0"/>
           </a:p>
           <a:p>
             <a:pPr marL="0" indent="0">
               <a:buFont typeface="Wingdings" panose="05000000000000000000" pitchFamily="2" charset="2"/>
               <a:buNone/>
             </a:pPr>
-            <a:endParaRPr lang="en-US" dirty="0"/>
+            <a:endParaRPr lang="en-US" sz="2800" dirty="0"/>
           </a:p>
         </p:txBody>
       </p:sp>
@@ -20539,7 +20430,7 @@
         </p:nvSpPr>
         <p:spPr>
           <a:xfrm>
-            <a:off x="29821367" y="28981768"/>
+            <a:off x="29900880" y="28125492"/>
             <a:ext cx="12801600" cy="1219200"/>
           </a:xfrm>
           <a:prstGeom prst="round1Rect">
@@ -20777,10 +20668,254 @@
           </a:lstStyle>
           <a:p>
             <a:r>
-              <a:rPr lang="en-US" sz="5400" dirty="0" smtClean="0"/>
+              <a:rPr lang="en-US" sz="5400" dirty="0"/>
               <a:t>references</a:t>
             </a:r>
-            <a:endParaRPr lang="en-US" sz="5400" dirty="0"/>
+          </a:p>
+        </p:txBody>
+      </p:sp>
+      <p:sp>
+        <p:nvSpPr>
+          <p:cNvPr id="83" name="Content Placeholder 13">
+            <a:extLst>
+              <a:ext uri="{FF2B5EF4-FFF2-40B4-BE49-F238E27FC236}">
+                <a16:creationId xmlns:a16="http://schemas.microsoft.com/office/drawing/2014/main" xmlns="" id="{801749A7-2409-6A4A-AE38-7774B64CD1D2}"/>
+              </a:ext>
+            </a:extLst>
+          </p:cNvPr>
+          <p:cNvSpPr txBox="1">
+            <a:spLocks/>
+          </p:cNvSpPr>
+          <p:nvPr/>
+        </p:nvSpPr>
+        <p:spPr>
+          <a:xfrm>
+            <a:off x="29690916" y="29320863"/>
+            <a:ext cx="12642574" cy="3095224"/>
+          </a:xfrm>
+          <a:prstGeom prst="rect">
+            <a:avLst/>
+          </a:prstGeom>
+        </p:spPr>
+        <p:txBody>
+          <a:bodyPr vert="horz" lIns="365760" tIns="182880" rIns="91440" bIns="45720" rtlCol="0">
+            <a:normAutofit/>
+          </a:bodyPr>
+          <a:lstStyle>
+            <a:lvl1pPr marL="822960" indent="-822960" algn="l" defTabSz="3291840" rtl="0" eaLnBrk="1" latinLnBrk="0" hangingPunct="1">
+              <a:lnSpc>
+                <a:spcPct val="120000"/>
+              </a:lnSpc>
+              <a:spcBef>
+                <a:spcPts val="3600"/>
+              </a:spcBef>
+              <a:buClr>
+                <a:schemeClr val="accent1"/>
+              </a:buClr>
+              <a:buSzPct val="110000"/>
+              <a:buFont typeface="Wingdings" panose="05000000000000000000" pitchFamily="2" charset="2"/>
+              <a:buChar char="§"/>
+              <a:defRPr sz="7680" kern="1200" baseline="0">
+                <a:solidFill>
+                  <a:schemeClr val="tx1"/>
+                </a:solidFill>
+                <a:effectLst/>
+                <a:latin typeface="+mn-lt"/>
+                <a:ea typeface="+mn-ea"/>
+                <a:cs typeface="+mn-cs"/>
+              </a:defRPr>
+            </a:lvl1pPr>
+            <a:lvl2pPr marL="2468880" indent="-822960" algn="l" defTabSz="3291840" rtl="0" eaLnBrk="1" latinLnBrk="0" hangingPunct="1">
+              <a:lnSpc>
+                <a:spcPct val="120000"/>
+              </a:lnSpc>
+              <a:spcBef>
+                <a:spcPts val="1800"/>
+              </a:spcBef>
+              <a:buClr>
+                <a:schemeClr val="accent1"/>
+              </a:buClr>
+              <a:buSzPct val="110000"/>
+              <a:buFont typeface="Wingdings" panose="05000000000000000000" pitchFamily="2" charset="2"/>
+              <a:buChar char="§"/>
+              <a:defRPr sz="6720" kern="1200">
+                <a:solidFill>
+                  <a:schemeClr val="tx1"/>
+                </a:solidFill>
+                <a:effectLst/>
+                <a:latin typeface="+mn-lt"/>
+                <a:ea typeface="+mn-ea"/>
+                <a:cs typeface="+mn-cs"/>
+              </a:defRPr>
+            </a:lvl2pPr>
+            <a:lvl3pPr marL="4114800" indent="-822960" algn="l" defTabSz="3291840" rtl="0" eaLnBrk="1" latinLnBrk="0" hangingPunct="1">
+              <a:lnSpc>
+                <a:spcPct val="120000"/>
+              </a:lnSpc>
+              <a:spcBef>
+                <a:spcPts val="1800"/>
+              </a:spcBef>
+              <a:buClr>
+                <a:schemeClr val="accent1"/>
+              </a:buClr>
+              <a:buSzPct val="110000"/>
+              <a:buFont typeface="Wingdings" panose="05000000000000000000" pitchFamily="2" charset="2"/>
+              <a:buChar char="§"/>
+              <a:defRPr sz="5760" kern="1200">
+                <a:solidFill>
+                  <a:schemeClr val="tx1"/>
+                </a:solidFill>
+                <a:effectLst/>
+                <a:latin typeface="+mn-lt"/>
+                <a:ea typeface="+mn-ea"/>
+                <a:cs typeface="+mn-cs"/>
+              </a:defRPr>
+            </a:lvl3pPr>
+            <a:lvl4pPr marL="5760720" indent="-822960" algn="l" defTabSz="3291840" rtl="0" eaLnBrk="1" latinLnBrk="0" hangingPunct="1">
+              <a:lnSpc>
+                <a:spcPct val="120000"/>
+              </a:lnSpc>
+              <a:spcBef>
+                <a:spcPts val="1800"/>
+              </a:spcBef>
+              <a:buClr>
+                <a:schemeClr val="accent1"/>
+              </a:buClr>
+              <a:buSzPct val="110000"/>
+              <a:buFont typeface="Wingdings" panose="05000000000000000000" pitchFamily="2" charset="2"/>
+              <a:buChar char="§"/>
+              <a:defRPr sz="5760" kern="1200">
+                <a:solidFill>
+                  <a:schemeClr val="tx1"/>
+                </a:solidFill>
+                <a:effectLst/>
+                <a:latin typeface="+mn-lt"/>
+                <a:ea typeface="+mn-ea"/>
+                <a:cs typeface="+mn-cs"/>
+              </a:defRPr>
+            </a:lvl4pPr>
+            <a:lvl5pPr marL="7406640" indent="-822960" algn="l" defTabSz="3291840" rtl="0" eaLnBrk="1" latinLnBrk="0" hangingPunct="1">
+              <a:lnSpc>
+                <a:spcPct val="120000"/>
+              </a:lnSpc>
+              <a:spcBef>
+                <a:spcPts val="1800"/>
+              </a:spcBef>
+              <a:buClr>
+                <a:schemeClr val="accent1"/>
+              </a:buClr>
+              <a:buSzPct val="110000"/>
+              <a:buFont typeface="Wingdings" panose="05000000000000000000" pitchFamily="2" charset="2"/>
+              <a:buChar char="§"/>
+              <a:defRPr sz="5760" kern="1200">
+                <a:solidFill>
+                  <a:schemeClr val="tx1"/>
+                </a:solidFill>
+                <a:effectLst/>
+                <a:latin typeface="+mn-lt"/>
+                <a:ea typeface="+mn-ea"/>
+                <a:cs typeface="+mn-cs"/>
+              </a:defRPr>
+            </a:lvl5pPr>
+            <a:lvl6pPr marL="9052560" indent="-822960" algn="l" defTabSz="3291840" rtl="0" eaLnBrk="1" latinLnBrk="0" hangingPunct="1">
+              <a:lnSpc>
+                <a:spcPct val="120000"/>
+              </a:lnSpc>
+              <a:spcBef>
+                <a:spcPts val="1800"/>
+              </a:spcBef>
+              <a:buClr>
+                <a:schemeClr val="accent1"/>
+              </a:buClr>
+              <a:buSzPct val="110000"/>
+              <a:buFont typeface="Wingdings" panose="05000000000000000000" pitchFamily="2" charset="2"/>
+              <a:buChar char="§"/>
+              <a:defRPr sz="4320" kern="1200">
+                <a:solidFill>
+                  <a:schemeClr val="tx1"/>
+                </a:solidFill>
+                <a:effectLst/>
+                <a:latin typeface="+mn-lt"/>
+                <a:ea typeface="+mn-ea"/>
+                <a:cs typeface="+mn-cs"/>
+              </a:defRPr>
+            </a:lvl6pPr>
+            <a:lvl7pPr marL="10698480" indent="-822960" algn="l" defTabSz="3291840" rtl="0" eaLnBrk="1" latinLnBrk="0" hangingPunct="1">
+              <a:lnSpc>
+                <a:spcPct val="120000"/>
+              </a:lnSpc>
+              <a:spcBef>
+                <a:spcPts val="1800"/>
+              </a:spcBef>
+              <a:buClr>
+                <a:schemeClr val="accent1"/>
+              </a:buClr>
+              <a:buSzPct val="110000"/>
+              <a:buFont typeface="Wingdings" panose="05000000000000000000" pitchFamily="2" charset="2"/>
+              <a:buChar char="§"/>
+              <a:defRPr sz="4320" kern="1200">
+                <a:solidFill>
+                  <a:schemeClr val="tx1"/>
+                </a:solidFill>
+                <a:effectLst/>
+                <a:latin typeface="+mn-lt"/>
+                <a:ea typeface="+mn-ea"/>
+                <a:cs typeface="+mn-cs"/>
+              </a:defRPr>
+            </a:lvl7pPr>
+            <a:lvl8pPr marL="12344400" indent="-822960" algn="l" defTabSz="3291840" rtl="0" eaLnBrk="1" latinLnBrk="0" hangingPunct="1">
+              <a:lnSpc>
+                <a:spcPct val="120000"/>
+              </a:lnSpc>
+              <a:spcBef>
+                <a:spcPts val="1800"/>
+              </a:spcBef>
+              <a:buClr>
+                <a:schemeClr val="accent1"/>
+              </a:buClr>
+              <a:buSzPct val="110000"/>
+              <a:buFont typeface="Wingdings" panose="05000000000000000000" pitchFamily="2" charset="2"/>
+              <a:buChar char="§"/>
+              <a:defRPr sz="4320" kern="1200">
+                <a:solidFill>
+                  <a:schemeClr val="tx1"/>
+                </a:solidFill>
+                <a:effectLst/>
+                <a:latin typeface="+mn-lt"/>
+                <a:ea typeface="+mn-ea"/>
+                <a:cs typeface="+mn-cs"/>
+              </a:defRPr>
+            </a:lvl8pPr>
+            <a:lvl9pPr marL="13990320" indent="-822960" algn="l" defTabSz="3291840" rtl="0" eaLnBrk="1" latinLnBrk="0" hangingPunct="1">
+              <a:lnSpc>
+                <a:spcPct val="120000"/>
+              </a:lnSpc>
+              <a:spcBef>
+                <a:spcPts val="1800"/>
+              </a:spcBef>
+              <a:buClr>
+                <a:schemeClr val="accent1"/>
+              </a:buClr>
+              <a:buSzPct val="110000"/>
+              <a:buFont typeface="Wingdings" panose="05000000000000000000" pitchFamily="2" charset="2"/>
+              <a:buChar char="§"/>
+              <a:defRPr sz="4320" kern="1200">
+                <a:solidFill>
+                  <a:schemeClr val="tx1"/>
+                </a:solidFill>
+                <a:effectLst/>
+                <a:latin typeface="+mn-lt"/>
+                <a:ea typeface="+mn-ea"/>
+                <a:cs typeface="+mn-cs"/>
+              </a:defRPr>
+            </a:lvl9pPr>
+          </a:lstStyle>
+          <a:p>
+            <a:pPr marL="0" indent="0">
+              <a:buFont typeface="Wingdings" panose="05000000000000000000" pitchFamily="2" charset="2"/>
+              <a:buNone/>
+            </a:pPr>
+            <a:endParaRPr lang="en-US" dirty="0"/>
           </a:p>
         </p:txBody>
       </p:sp>
@@ -20800,8 +20935,8 @@
         </p:nvSpPr>
         <p:spPr>
           <a:xfrm>
-            <a:off x="29821367" y="30185089"/>
-            <a:ext cx="12801600" cy="1666930"/>
+            <a:off x="29821367" y="29723699"/>
+            <a:ext cx="12801600" cy="2489506"/>
           </a:xfrm>
           <a:prstGeom prst="rect">
             <a:avLst/>
@@ -21022,53 +21157,96 @@
           </a:lstStyle>
           <a:p>
             <a:pPr marL="0" indent="0">
+              <a:lnSpc>
+                <a:spcPct val="100000"/>
+              </a:lnSpc>
               <a:buNone/>
             </a:pPr>
             <a:r>
-              <a:rPr lang="en-US" sz="2800" dirty="0" smtClean="0"/>
-              <a:t>[1] </a:t>
+              <a:rPr lang="en-US" sz="2400" dirty="0"/>
+              <a:t>[1] T</a:t>
             </a:r>
             <a:r>
-              <a:rPr lang="en-US" sz="2800" dirty="0"/>
-              <a:t>T</a:t>
+              <a:rPr lang="en-US" sz="2400" dirty="0" smtClean="0"/>
+              <a:t>. Benson</a:t>
             </a:r>
             <a:r>
-              <a:rPr lang="en-US" sz="2800" dirty="0" smtClean="0"/>
-              <a:t>. Benson, A. </a:t>
+              <a:rPr lang="en-US" sz="2400" dirty="0"/>
+              <a:t>, </a:t>
             </a:r>
             <a:r>
-              <a:rPr lang="en-US" sz="2800" dirty="0" err="1" smtClean="0"/>
+              <a:rPr lang="en-US" sz="2400" dirty="0" smtClean="0"/>
+              <a:t>A. </a:t>
+            </a:r>
+            <a:r>
+              <a:rPr lang="en-US" sz="2400" dirty="0" err="1" smtClean="0"/>
               <a:t>Akella</a:t>
             </a:r>
             <a:r>
-              <a:rPr lang="en-US" sz="2800" dirty="0" smtClean="0"/>
-              <a:t>, and D. </a:t>
+              <a:rPr lang="en-US" sz="2400" dirty="0"/>
+              <a:t>, and D</a:t>
             </a:r>
             <a:r>
-              <a:rPr lang="en-US" sz="2800" dirty="0" err="1" smtClean="0"/>
+              <a:rPr lang="en-US" sz="2400" dirty="0" smtClean="0"/>
+              <a:t>. </a:t>
+            </a:r>
+            <a:r>
+              <a:rPr lang="en-US" sz="2400" dirty="0" err="1" smtClean="0"/>
               <a:t>Maltz</a:t>
             </a:r>
             <a:r>
-              <a:rPr lang="en-US" sz="2800" dirty="0" smtClean="0"/>
-              <a:t>. Unraveling the complexity of </a:t>
+              <a:rPr lang="en-US" sz="2400" dirty="0"/>
+              <a:t>. Unraveling the complexity of network management. In </a:t>
             </a:r>
             <a:r>
-              <a:rPr lang="en-US" sz="2800" dirty="0"/>
-              <a:t>network management. In </a:t>
-            </a:r>
-            <a:r>
-              <a:rPr lang="en-US" sz="2800" i="1" dirty="0"/>
+              <a:rPr lang="en-US" sz="2400" i="1" dirty="0"/>
               <a:t>NSDI</a:t>
             </a:r>
             <a:r>
-              <a:rPr lang="en-US" sz="2800" dirty="0"/>
-              <a:t>, 2009</a:t>
+              <a:rPr lang="en-US" sz="2400" dirty="0"/>
+              <a:t>, </a:t>
             </a:r>
             <a:r>
-              <a:rPr lang="en-US" sz="2800" dirty="0" smtClean="0"/>
-              <a:t>.</a:t>
+              <a:rPr lang="en-US" sz="2400" dirty="0" smtClean="0"/>
+              <a:t>2009.</a:t>
             </a:r>
-            <a:endParaRPr lang="en-US" sz="2800" dirty="0"/>
+          </a:p>
+          <a:p>
+            <a:pPr marL="0" indent="0">
+              <a:lnSpc>
+                <a:spcPct val="100000"/>
+              </a:lnSpc>
+              <a:buNone/>
+            </a:pPr>
+            <a:r>
+              <a:rPr lang="en-US" sz="2400" dirty="0" smtClean="0"/>
+              <a:t>[2] Z. Yin, X. Ma, J. Zheng, Y. Zhou, L. N. </a:t>
+            </a:r>
+            <a:r>
+              <a:rPr lang="en-US" sz="2400" dirty="0" err="1" smtClean="0"/>
+              <a:t>Bairavasundaram</a:t>
+            </a:r>
+            <a:r>
+              <a:rPr lang="en-US" sz="2400" dirty="0" smtClean="0"/>
+              <a:t>, and S. </a:t>
+            </a:r>
+            <a:r>
+              <a:rPr lang="en-US" sz="2400" dirty="0" err="1" smtClean="0"/>
+              <a:t>Pasupathy</a:t>
+            </a:r>
+            <a:r>
+              <a:rPr lang="en-US" sz="2400" dirty="0" smtClean="0"/>
+              <a:t>. An empirical study on configuration errors in commercial and open source systems. In </a:t>
+            </a:r>
+            <a:r>
+              <a:rPr lang="en-US" sz="2400" i="1" dirty="0" smtClean="0"/>
+              <a:t>SOSP</a:t>
+            </a:r>
+            <a:r>
+              <a:rPr lang="en-US" sz="2400" dirty="0" smtClean="0"/>
+              <a:t>, 2011.</a:t>
+            </a:r>
+            <a:endParaRPr lang="en-US" sz="2400" dirty="0"/>
           </a:p>
         </p:txBody>
       </p:sp>
@@ -21335,7 +21513,7 @@
         </p:nvSpPr>
         <p:spPr>
           <a:xfrm>
-            <a:off x="15642754" y="21958571"/>
+            <a:off x="15642754" y="21867131"/>
             <a:ext cx="12877133" cy="5405395"/>
           </a:xfrm>
           <a:prstGeom prst="rect">
@@ -21562,15 +21740,7 @@
             </a:pPr>
             <a:r>
               <a:rPr lang="en-US" sz="2800" dirty="0"/>
-              <a:t>We applied our framework to Cisco configurations of core, border, and distribution routers from three large university networks. To test the accuracy of our model, we perform </a:t>
-            </a:r>
-            <a:r>
-              <a:rPr lang="en-US" sz="2800" dirty="0" smtClean="0"/>
-              <a:t>leave-one-out </a:t>
-            </a:r>
-            <a:r>
-              <a:rPr lang="en-US" sz="2800" dirty="0"/>
-              <a:t>cross validation: one (set of) configuration(s) is used for testing and the remainder are used for training. We “rebuild” the test configuration(s) token-by-token by using our n-gram model to predict the next token based on the prior n-1 tokens; we do not predict across lines. A prediction is marked as successful when the actual next token in the configuration is within the top three results generated by the model. </a:t>
+              <a:t>We applied our framework to Cisco configurations of core, border, and distribution routers from three large university networks. To test the accuracy of our model, we perform leave-one- out cross validation: one (set of) configuration(s) is used for testing and the remainder are used for training. We “rebuild” the test configuration(s) token-by-token by using our n-gram model to predict the next token based on the prior n-1 tokens; we do not predict across lines. A prediction is marked as successful when the actual next token in the configuration is within the top three results generated by the model. </a:t>
             </a:r>
           </a:p>
         </p:txBody>
@@ -22249,8 +22419,13 @@
           <a:p>
             <a:r>
               <a:rPr lang="en-US" sz="2800" dirty="0"/>
-              <a:t>Configuration errors are common and the leading cause of network outages</a:t>
+              <a:t>Configuration errors are common and the leading cause of network </a:t>
             </a:r>
+            <a:r>
+              <a:rPr lang="en-US" sz="2800" dirty="0" smtClean="0"/>
+              <a:t>outages [2]</a:t>
+            </a:r>
+            <a:endParaRPr lang="en-US" sz="2800" dirty="0"/>
           </a:p>
         </p:txBody>
       </p:sp>
@@ -22270,8 +22445,8 @@
         </p:nvSpPr>
         <p:spPr>
           <a:xfrm>
-            <a:off x="15893285" y="13513066"/>
-            <a:ext cx="6014144" cy="5403516"/>
+            <a:off x="15985282" y="13133120"/>
+            <a:ext cx="6008987" cy="5799396"/>
           </a:xfrm>
           <a:prstGeom prst="rect">
             <a:avLst/>
@@ -22518,8 +22693,8 @@
         </p:nvSpPr>
         <p:spPr>
           <a:xfrm>
-            <a:off x="16607674" y="19292445"/>
-            <a:ext cx="12086029" cy="954107"/>
+            <a:off x="15665002" y="19646199"/>
+            <a:ext cx="13422905" cy="954107"/>
           </a:xfrm>
           <a:prstGeom prst="rect">
             <a:avLst/>
@@ -22534,16 +22709,12 @@
           <a:p>
             <a:pPr algn="ctr"/>
             <a:r>
-              <a:rPr lang="en-US" sz="2800" b="1" dirty="0" smtClean="0"/>
+              <a:rPr lang="en-US" sz="2800" b="1" dirty="0"/>
               <a:t>Figure 2</a:t>
             </a:r>
             <a:r>
-              <a:rPr lang="en-US" sz="2800" dirty="0" smtClean="0"/>
-              <a:t>: </a:t>
-            </a:r>
-            <a:r>
               <a:rPr lang="en-US" sz="2800" dirty="0"/>
-              <a:t>With our placeholders optimization, this accuracy is 5% higher. </a:t>
+              <a:t>: With our placeholders optimization, this accuracy is 5% higher. </a:t>
             </a:r>
           </a:p>
           <a:p>
@@ -22554,7 +22725,49 @@
       </p:sp>
       <p:pic>
         <p:nvPicPr>
-          <p:cNvPr id="2" name="Picture 1"/>
+          <p:cNvPr id="15" name="Picture 14">
+            <a:extLst>
+              <a:ext uri="{FF2B5EF4-FFF2-40B4-BE49-F238E27FC236}">
+                <a16:creationId xmlns:a16="http://schemas.microsoft.com/office/drawing/2014/main" xmlns="" id="{9DF23748-80C6-5C4C-B02F-D02ADA34C989}"/>
+              </a:ext>
+            </a:extLst>
+          </p:cNvPr>
+          <p:cNvPicPr>
+            <a:picLocks noChangeAspect="1"/>
+          </p:cNvPicPr>
+          <p:nvPr/>
+        </p:nvPicPr>
+        <p:blipFill>
+          <a:blip r:embed="rId8">
+            <a:extLst>
+              <a:ext uri="{28A0092B-C50C-407E-A947-70E740481C1C}">
+                <a14:useLocalDpi xmlns:a14="http://schemas.microsoft.com/office/drawing/2010/main" val="0"/>
+              </a:ext>
+            </a:extLst>
+          </a:blip>
+          <a:stretch>
+            <a:fillRect/>
+          </a:stretch>
+        </p:blipFill>
+        <p:spPr>
+          <a:xfrm>
+            <a:off x="36371515" y="6968605"/>
+            <a:ext cx="6902408" cy="5829242"/>
+          </a:xfrm>
+          <a:prstGeom prst="rect">
+            <a:avLst/>
+          </a:prstGeom>
+        </p:spPr>
+      </p:pic>
+      <p:pic>
+        <p:nvPicPr>
+          <p:cNvPr id="3" name="Picture 2">
+            <a:extLst>
+              <a:ext uri="{FF2B5EF4-FFF2-40B4-BE49-F238E27FC236}">
+                <a16:creationId xmlns:a16="http://schemas.microsoft.com/office/drawing/2014/main" xmlns="" id="{C5071A02-EC5C-D14B-9B95-F29A023F1942}"/>
+              </a:ext>
+            </a:extLst>
+          </p:cNvPr>
           <p:cNvPicPr>
             <a:picLocks noChangeAspect="1"/>
           </p:cNvPicPr>
@@ -22574,14 +22787,63 @@
         </p:blipFill>
         <p:spPr>
           <a:xfrm>
-            <a:off x="39386031" y="721776"/>
-            <a:ext cx="3671161" cy="3671161"/>
+            <a:off x="38846755" y="361637"/>
+            <a:ext cx="4119880" cy="4188544"/>
           </a:xfrm>
           <a:prstGeom prst="rect">
             <a:avLst/>
           </a:prstGeom>
         </p:spPr>
       </p:pic>
+      <p:sp>
+        <p:nvSpPr>
+          <p:cNvPr id="21" name="Text Placeholder 20"/>
+          <p:cNvSpPr>
+            <a:spLocks noGrp="1"/>
+          </p:cNvSpPr>
+          <p:nvPr>
+            <p:ph type="body" sz="quarter" idx="31"/>
+          </p:nvPr>
+        </p:nvSpPr>
+        <p:spPr/>
+        <p:txBody>
+          <a:bodyPr/>
+          <a:lstStyle/>
+          <a:p>
+            <a:r>
+              <a:rPr lang="en-US" dirty="0"/>
+              <a:t>Results</a:t>
+            </a:r>
+          </a:p>
+        </p:txBody>
+      </p:sp>
+      <p:sp>
+        <p:nvSpPr>
+          <p:cNvPr id="23" name="Text Placeholder 22"/>
+          <p:cNvSpPr>
+            <a:spLocks noGrp="1"/>
+          </p:cNvSpPr>
+          <p:nvPr>
+            <p:ph type="body" sz="quarter" idx="34"/>
+          </p:nvPr>
+        </p:nvSpPr>
+        <p:spPr>
+          <a:xfrm>
+            <a:off x="29821367" y="22809475"/>
+            <a:ext cx="12801600" cy="1219200"/>
+          </a:xfrm>
+        </p:spPr>
+        <p:txBody>
+          <a:bodyPr/>
+          <a:lstStyle/>
+          <a:p>
+            <a:r>
+              <a:rPr lang="en-US" dirty="0"/>
+              <a:t>Future work</a:t>
+            </a:r>
+          </a:p>
+        </p:txBody>
+      </p:sp>
     </p:spTree>
     <p:extLst>
       <p:ext uri="{BB962C8B-B14F-4D97-AF65-F5344CB8AC3E}">
@@ -22592,13 +22854,6 @@
   <p:clrMapOvr>
     <a:masterClrMapping/>
   </p:clrMapOvr>
-  <p:timing>
-    <p:tnLst>
-      <p:par>
-        <p:cTn id="1" dur="indefinite" restart="never" nodeType="tmRoot"/>
-      </p:par>
-    </p:tnLst>
-  </p:timing>
 </p:sld>
 </file>
 
@@ -23382,6 +23637,15 @@
 </file>
 
 <file path=customXml/item1.xml><?xml version="1.0" encoding="utf-8"?>
+<?mso-contentType ?>
+<FormTemplates xmlns="http://schemas.microsoft.com/sharepoint/v3/contenttype/forms">
+  <Display>DocumentLibraryForm</Display>
+  <Edit>AssetEditForm</Edit>
+  <New>DocumentLibraryForm</New>
+</FormTemplates>
+</file>
+
+<file path=customXml/item2.xml><?xml version="1.0" encoding="utf-8"?>
 <p:properties xmlns:p="http://schemas.microsoft.com/office/2006/metadata/properties" xmlns:xsi="http://www.w3.org/2001/XMLSchema-instance" xmlns:pc="http://schemas.microsoft.com/office/infopath/2007/PartnerControls">
   <documentManagement>
     <DirectSourceMarket xmlns="4873beb7-5857-4685-be1f-d57550cc96cc" xsi:nil="true"/>
@@ -23506,15 +23770,6 @@
     </LocalizationTagsTaxHTField0>
   </documentManagement>
 </p:properties>
-</file>
-
-<file path=customXml/item2.xml><?xml version="1.0" encoding="utf-8"?>
-<?mso-contentType ?>
-<FormTemplates xmlns="http://schemas.microsoft.com/sharepoint/v3/contenttype/forms">
-  <Display>DocumentLibraryForm</Display>
-  <Edit>AssetEditForm</Edit>
-  <New>DocumentLibraryForm</New>
-</FormTemplates>
 </file>
 
 <file path=customXml/item3.xml><?xml version="1.0" encoding="utf-8"?>
@@ -24558,19 +24813,19 @@
 </file>
 
 <file path=customXml/itemProps1.xml><?xml version="1.0" encoding="utf-8"?>
+<ds:datastoreItem xmlns:ds="http://schemas.openxmlformats.org/officeDocument/2006/customXml" ds:itemID="{A1110015-E380-4C53-980C-698226C61CAC}">
+  <ds:schemaRefs>
+    <ds:schemaRef ds:uri="http://schemas.microsoft.com/sharepoint/v3/contenttype/forms"/>
+  </ds:schemaRefs>
+</ds:datastoreItem>
+</file>
+
+<file path=customXml/itemProps2.xml><?xml version="1.0" encoding="utf-8"?>
 <ds:datastoreItem xmlns:ds="http://schemas.openxmlformats.org/officeDocument/2006/customXml" ds:itemID="{A9F945EE-6400-432A-A9B1-179A0A2A37CE}">
   <ds:schemaRefs>
     <ds:schemaRef ds:uri="http://schemas.microsoft.com/office/2006/metadata/properties"/>
     <ds:schemaRef ds:uri="http://schemas.microsoft.com/office/infopath/2007/PartnerControls"/>
     <ds:schemaRef ds:uri="4873beb7-5857-4685-be1f-d57550cc96cc"/>
-  </ds:schemaRefs>
-</ds:datastoreItem>
-</file>
-
-<file path=customXml/itemProps2.xml><?xml version="1.0" encoding="utf-8"?>
-<ds:datastoreItem xmlns:ds="http://schemas.openxmlformats.org/officeDocument/2006/customXml" ds:itemID="{A1110015-E380-4C53-980C-698226C61CAC}">
-  <ds:schemaRefs>
-    <ds:schemaRef ds:uri="http://schemas.microsoft.com/sharepoint/v3/contenttype/forms"/>
   </ds:schemaRefs>
 </ds:datastoreItem>
 </file>

</xml_diff>